<commit_message>
Added extra block diagram
</commit_message>
<xml_diff>
--- a/new_acquisition/nucleo data flow and sw structure.pptx
+++ b/new_acquisition/nucleo data flow and sw structure.pptx
@@ -6,6 +6,7 @@
   </p:sldMasterIdLst>
   <p:sldIdLst>
     <p:sldId id="256" r:id="rId2"/>
+    <p:sldId id="257" r:id="rId3"/>
   </p:sldIdLst>
   <p:sldSz cx="12192000" cy="6858000"/>
   <p:notesSz cx="6858000" cy="9144000"/>
@@ -263,7 +264,7 @@
           <a:p>
             <a:fld id="{952D8749-70C6-48E7-AB63-DFF662370668}" type="datetimeFigureOut">
               <a:rPr lang="en-US" smtClean="0"/>
-              <a:t>10/1/2017</a:t>
+              <a:t>10/11/2017</a:t>
             </a:fld>
             <a:endParaRPr lang="en-US" dirty="0"/>
           </a:p>
@@ -461,7 +462,7 @@
           <a:p>
             <a:fld id="{952D8749-70C6-48E7-AB63-DFF662370668}" type="datetimeFigureOut">
               <a:rPr lang="en-US" smtClean="0"/>
-              <a:t>10/1/2017</a:t>
+              <a:t>10/11/2017</a:t>
             </a:fld>
             <a:endParaRPr lang="en-US" dirty="0"/>
           </a:p>
@@ -669,7 +670,7 @@
           <a:p>
             <a:fld id="{952D8749-70C6-48E7-AB63-DFF662370668}" type="datetimeFigureOut">
               <a:rPr lang="en-US" smtClean="0"/>
-              <a:t>10/1/2017</a:t>
+              <a:t>10/11/2017</a:t>
             </a:fld>
             <a:endParaRPr lang="en-US" dirty="0"/>
           </a:p>
@@ -867,7 +868,7 @@
           <a:p>
             <a:fld id="{952D8749-70C6-48E7-AB63-DFF662370668}" type="datetimeFigureOut">
               <a:rPr lang="en-US" smtClean="0"/>
-              <a:t>10/1/2017</a:t>
+              <a:t>10/11/2017</a:t>
             </a:fld>
             <a:endParaRPr lang="en-US" dirty="0"/>
           </a:p>
@@ -1142,7 +1143,7 @@
           <a:p>
             <a:fld id="{952D8749-70C6-48E7-AB63-DFF662370668}" type="datetimeFigureOut">
               <a:rPr lang="en-US" smtClean="0"/>
-              <a:t>10/1/2017</a:t>
+              <a:t>10/11/2017</a:t>
             </a:fld>
             <a:endParaRPr lang="en-US" dirty="0"/>
           </a:p>
@@ -1407,7 +1408,7 @@
           <a:p>
             <a:fld id="{952D8749-70C6-48E7-AB63-DFF662370668}" type="datetimeFigureOut">
               <a:rPr lang="en-US" smtClean="0"/>
-              <a:t>10/1/2017</a:t>
+              <a:t>10/11/2017</a:t>
             </a:fld>
             <a:endParaRPr lang="en-US" dirty="0"/>
           </a:p>
@@ -1819,7 +1820,7 @@
           <a:p>
             <a:fld id="{952D8749-70C6-48E7-AB63-DFF662370668}" type="datetimeFigureOut">
               <a:rPr lang="en-US" smtClean="0"/>
-              <a:t>10/1/2017</a:t>
+              <a:t>10/11/2017</a:t>
             </a:fld>
             <a:endParaRPr lang="en-US" dirty="0"/>
           </a:p>
@@ -1960,7 +1961,7 @@
           <a:p>
             <a:fld id="{952D8749-70C6-48E7-AB63-DFF662370668}" type="datetimeFigureOut">
               <a:rPr lang="en-US" smtClean="0"/>
-              <a:t>10/1/2017</a:t>
+              <a:t>10/11/2017</a:t>
             </a:fld>
             <a:endParaRPr lang="en-US" dirty="0"/>
           </a:p>
@@ -2073,7 +2074,7 @@
           <a:p>
             <a:fld id="{952D8749-70C6-48E7-AB63-DFF662370668}" type="datetimeFigureOut">
               <a:rPr lang="en-US" smtClean="0"/>
-              <a:t>10/1/2017</a:t>
+              <a:t>10/11/2017</a:t>
             </a:fld>
             <a:endParaRPr lang="en-US" dirty="0"/>
           </a:p>
@@ -2384,7 +2385,7 @@
           <a:p>
             <a:fld id="{952D8749-70C6-48E7-AB63-DFF662370668}" type="datetimeFigureOut">
               <a:rPr lang="en-US" smtClean="0"/>
-              <a:t>10/1/2017</a:t>
+              <a:t>10/11/2017</a:t>
             </a:fld>
             <a:endParaRPr lang="en-US" dirty="0"/>
           </a:p>
@@ -2672,7 +2673,7 @@
           <a:p>
             <a:fld id="{952D8749-70C6-48E7-AB63-DFF662370668}" type="datetimeFigureOut">
               <a:rPr lang="en-US" smtClean="0"/>
-              <a:t>10/1/2017</a:t>
+              <a:t>10/11/2017</a:t>
             </a:fld>
             <a:endParaRPr lang="en-US" dirty="0"/>
           </a:p>
@@ -2913,7 +2914,7 @@
           <a:p>
             <a:fld id="{952D8749-70C6-48E7-AB63-DFF662370668}" type="datetimeFigureOut">
               <a:rPr lang="en-US" smtClean="0"/>
-              <a:t>10/1/2017</a:t>
+              <a:t>10/11/2017</a:t>
             </a:fld>
             <a:endParaRPr lang="en-US" dirty="0"/>
           </a:p>
@@ -5245,6 +5246,1048 @@
 </p:sld>
 </file>
 
+<file path=ppt/slides/slide2.xml><?xml version="1.0" encoding="utf-8"?>
+<p:sld xmlns:a="http://schemas.openxmlformats.org/drawingml/2006/main" xmlns:r="http://schemas.openxmlformats.org/officeDocument/2006/relationships" xmlns:p="http://schemas.openxmlformats.org/presentationml/2006/main">
+  <p:cSld>
+    <p:spTree>
+      <p:nvGrpSpPr>
+        <p:cNvPr id="1" name=""/>
+        <p:cNvGrpSpPr/>
+        <p:nvPr/>
+      </p:nvGrpSpPr>
+      <p:grpSpPr>
+        <a:xfrm>
+          <a:off x="0" y="0"/>
+          <a:ext cx="0" cy="0"/>
+          <a:chOff x="0" y="0"/>
+          <a:chExt cx="0" cy="0"/>
+        </a:xfrm>
+      </p:grpSpPr>
+      <p:sp>
+        <p:nvSpPr>
+          <p:cNvPr id="25" name="Arrow: Right 24">
+            <a:extLst>
+              <a:ext uri="{FF2B5EF4-FFF2-40B4-BE49-F238E27FC236}">
+                <a16:creationId xmlns:a16="http://schemas.microsoft.com/office/drawing/2014/main" id="{37673120-A632-4066-A597-642F0FBE99D0}"/>
+              </a:ext>
+            </a:extLst>
+          </p:cNvPr>
+          <p:cNvSpPr/>
+          <p:nvPr/>
+        </p:nvSpPr>
+        <p:spPr>
+          <a:xfrm>
+            <a:off x="2469255" y="5395556"/>
+            <a:ext cx="1638300" cy="271463"/>
+          </a:xfrm>
+          <a:prstGeom prst="rightArrow">
+            <a:avLst/>
+          </a:prstGeom>
+          <a:solidFill>
+            <a:schemeClr val="tx1"/>
+          </a:solidFill>
+        </p:spPr>
+        <p:style>
+          <a:lnRef idx="2">
+            <a:schemeClr val="accent1">
+              <a:shade val="50000"/>
+            </a:schemeClr>
+          </a:lnRef>
+          <a:fillRef idx="1">
+            <a:schemeClr val="accent1"/>
+          </a:fillRef>
+          <a:effectRef idx="0">
+            <a:schemeClr val="accent1"/>
+          </a:effectRef>
+          <a:fontRef idx="minor">
+            <a:schemeClr val="lt1"/>
+          </a:fontRef>
+        </p:style>
+        <p:txBody>
+          <a:bodyPr rtlCol="0" anchor="ctr"/>
+          <a:lstStyle/>
+          <a:p>
+            <a:pPr algn="ctr"/>
+            <a:endParaRPr lang="en-US"/>
+          </a:p>
+        </p:txBody>
+      </p:sp>
+      <p:sp>
+        <p:nvSpPr>
+          <p:cNvPr id="3" name="Rectangle 2">
+            <a:extLst>
+              <a:ext uri="{FF2B5EF4-FFF2-40B4-BE49-F238E27FC236}">
+                <a16:creationId xmlns:a16="http://schemas.microsoft.com/office/drawing/2014/main" id="{89ABE4D5-8F26-4AA4-B4F5-556E5B98D6F5}"/>
+              </a:ext>
+            </a:extLst>
+          </p:cNvPr>
+          <p:cNvSpPr/>
+          <p:nvPr/>
+        </p:nvSpPr>
+        <p:spPr>
+          <a:xfrm>
+            <a:off x="4107555" y="1035422"/>
+            <a:ext cx="1828800" cy="1828800"/>
+          </a:xfrm>
+          <a:prstGeom prst="rect">
+            <a:avLst/>
+          </a:prstGeom>
+        </p:spPr>
+        <p:style>
+          <a:lnRef idx="2">
+            <a:schemeClr val="accent1">
+              <a:shade val="50000"/>
+            </a:schemeClr>
+          </a:lnRef>
+          <a:fillRef idx="1">
+            <a:schemeClr val="accent1"/>
+          </a:fillRef>
+          <a:effectRef idx="0">
+            <a:schemeClr val="accent1"/>
+          </a:effectRef>
+          <a:fontRef idx="minor">
+            <a:schemeClr val="lt1"/>
+          </a:fontRef>
+        </p:style>
+        <p:txBody>
+          <a:bodyPr rtlCol="0" anchor="t"/>
+          <a:lstStyle/>
+          <a:p>
+            <a:pPr algn="ctr"/>
+            <a:r>
+              <a:rPr lang="en-US" sz="1400" dirty="0"/>
+              <a:t>Daughter Board</a:t>
+            </a:r>
+          </a:p>
+        </p:txBody>
+      </p:sp>
+      <p:sp>
+        <p:nvSpPr>
+          <p:cNvPr id="4" name="Rectangle 3">
+            <a:extLst>
+              <a:ext uri="{FF2B5EF4-FFF2-40B4-BE49-F238E27FC236}">
+                <a16:creationId xmlns:a16="http://schemas.microsoft.com/office/drawing/2014/main" id="{3014BB84-82CE-4118-B370-A150B3D686E6}"/>
+              </a:ext>
+            </a:extLst>
+          </p:cNvPr>
+          <p:cNvSpPr/>
+          <p:nvPr/>
+        </p:nvSpPr>
+        <p:spPr>
+          <a:xfrm>
+            <a:off x="4107555" y="4068248"/>
+            <a:ext cx="1828800" cy="1828800"/>
+          </a:xfrm>
+          <a:prstGeom prst="rect">
+            <a:avLst/>
+          </a:prstGeom>
+        </p:spPr>
+        <p:style>
+          <a:lnRef idx="2">
+            <a:schemeClr val="accent1">
+              <a:shade val="50000"/>
+            </a:schemeClr>
+          </a:lnRef>
+          <a:fillRef idx="1">
+            <a:schemeClr val="accent1"/>
+          </a:fillRef>
+          <a:effectRef idx="0">
+            <a:schemeClr val="accent1"/>
+          </a:effectRef>
+          <a:fontRef idx="minor">
+            <a:schemeClr val="lt1"/>
+          </a:fontRef>
+        </p:style>
+        <p:txBody>
+          <a:bodyPr rtlCol="0" anchor="t"/>
+          <a:lstStyle/>
+          <a:p>
+            <a:pPr algn="ctr"/>
+            <a:r>
+              <a:rPr lang="en-US" sz="1400" dirty="0"/>
+              <a:t>Daughter Board</a:t>
+            </a:r>
+          </a:p>
+        </p:txBody>
+      </p:sp>
+      <p:sp>
+        <p:nvSpPr>
+          <p:cNvPr id="5" name="Arrow: Up-Down 4">
+            <a:extLst>
+              <a:ext uri="{FF2B5EF4-FFF2-40B4-BE49-F238E27FC236}">
+                <a16:creationId xmlns:a16="http://schemas.microsoft.com/office/drawing/2014/main" id="{D3BC07FF-3354-49AC-AB19-76D4C1FDC8ED}"/>
+              </a:ext>
+            </a:extLst>
+          </p:cNvPr>
+          <p:cNvSpPr/>
+          <p:nvPr/>
+        </p:nvSpPr>
+        <p:spPr>
+          <a:xfrm>
+            <a:off x="7485530" y="1035422"/>
+            <a:ext cx="537882" cy="4861626"/>
+          </a:xfrm>
+          <a:prstGeom prst="upDownArrow">
+            <a:avLst/>
+          </a:prstGeom>
+        </p:spPr>
+        <p:style>
+          <a:lnRef idx="2">
+            <a:schemeClr val="accent1">
+              <a:shade val="50000"/>
+            </a:schemeClr>
+          </a:lnRef>
+          <a:fillRef idx="1">
+            <a:schemeClr val="accent1"/>
+          </a:fillRef>
+          <a:effectRef idx="0">
+            <a:schemeClr val="accent1"/>
+          </a:effectRef>
+          <a:fontRef idx="minor">
+            <a:schemeClr val="lt1"/>
+          </a:fontRef>
+        </p:style>
+        <p:txBody>
+          <a:bodyPr rtlCol="0" anchor="ctr"/>
+          <a:lstStyle/>
+          <a:p>
+            <a:pPr algn="ctr"/>
+            <a:r>
+              <a:rPr lang="en-US" dirty="0"/>
+              <a:t>CAN</a:t>
+            </a:r>
+          </a:p>
+        </p:txBody>
+      </p:sp>
+      <p:sp>
+        <p:nvSpPr>
+          <p:cNvPr id="6" name="Arrow: Curved Down 5">
+            <a:extLst>
+              <a:ext uri="{FF2B5EF4-FFF2-40B4-BE49-F238E27FC236}">
+                <a16:creationId xmlns:a16="http://schemas.microsoft.com/office/drawing/2014/main" id="{F083267F-71F6-4C6D-8B3A-46111FD342C6}"/>
+              </a:ext>
+            </a:extLst>
+          </p:cNvPr>
+          <p:cNvSpPr/>
+          <p:nvPr/>
+        </p:nvSpPr>
+        <p:spPr>
+          <a:xfrm>
+            <a:off x="5936355" y="1611404"/>
+            <a:ext cx="1842247" cy="676835"/>
+          </a:xfrm>
+          <a:prstGeom prst="curvedDownArrow">
+            <a:avLst/>
+          </a:prstGeom>
+        </p:spPr>
+        <p:style>
+          <a:lnRef idx="2">
+            <a:schemeClr val="accent1">
+              <a:shade val="50000"/>
+            </a:schemeClr>
+          </a:lnRef>
+          <a:fillRef idx="1">
+            <a:schemeClr val="accent1"/>
+          </a:fillRef>
+          <a:effectRef idx="0">
+            <a:schemeClr val="accent1"/>
+          </a:effectRef>
+          <a:fontRef idx="minor">
+            <a:schemeClr val="lt1"/>
+          </a:fontRef>
+        </p:style>
+        <p:txBody>
+          <a:bodyPr rtlCol="0" anchor="ctr"/>
+          <a:lstStyle/>
+          <a:p>
+            <a:pPr algn="ctr"/>
+            <a:endParaRPr lang="en-US">
+              <a:solidFill>
+                <a:schemeClr val="tx1"/>
+              </a:solidFill>
+            </a:endParaRPr>
+          </a:p>
+        </p:txBody>
+      </p:sp>
+      <p:sp>
+        <p:nvSpPr>
+          <p:cNvPr id="7" name="Arrow: Curved Down 6">
+            <a:extLst>
+              <a:ext uri="{FF2B5EF4-FFF2-40B4-BE49-F238E27FC236}">
+                <a16:creationId xmlns:a16="http://schemas.microsoft.com/office/drawing/2014/main" id="{EFD51507-C4B4-46DC-A0A1-AA8CE05CBD9B}"/>
+              </a:ext>
+            </a:extLst>
+          </p:cNvPr>
+          <p:cNvSpPr/>
+          <p:nvPr/>
+        </p:nvSpPr>
+        <p:spPr>
+          <a:xfrm>
+            <a:off x="5936355" y="4644230"/>
+            <a:ext cx="1842247" cy="676835"/>
+          </a:xfrm>
+          <a:prstGeom prst="curvedDownArrow">
+            <a:avLst/>
+          </a:prstGeom>
+        </p:spPr>
+        <p:style>
+          <a:lnRef idx="2">
+            <a:schemeClr val="accent1">
+              <a:shade val="50000"/>
+            </a:schemeClr>
+          </a:lnRef>
+          <a:fillRef idx="1">
+            <a:schemeClr val="accent1"/>
+          </a:fillRef>
+          <a:effectRef idx="0">
+            <a:schemeClr val="accent1"/>
+          </a:effectRef>
+          <a:fontRef idx="minor">
+            <a:schemeClr val="lt1"/>
+          </a:fontRef>
+        </p:style>
+        <p:txBody>
+          <a:bodyPr rtlCol="0" anchor="ctr"/>
+          <a:lstStyle/>
+          <a:p>
+            <a:pPr algn="ctr"/>
+            <a:endParaRPr lang="en-US">
+              <a:solidFill>
+                <a:schemeClr val="tx1"/>
+              </a:solidFill>
+            </a:endParaRPr>
+          </a:p>
+        </p:txBody>
+      </p:sp>
+      <p:sp>
+        <p:nvSpPr>
+          <p:cNvPr id="9" name="Rectangle 8">
+            <a:extLst>
+              <a:ext uri="{FF2B5EF4-FFF2-40B4-BE49-F238E27FC236}">
+                <a16:creationId xmlns:a16="http://schemas.microsoft.com/office/drawing/2014/main" id="{A088DDFA-5B12-44A6-8D3F-F352B9369B4E}"/>
+              </a:ext>
+            </a:extLst>
+          </p:cNvPr>
+          <p:cNvSpPr/>
+          <p:nvPr/>
+        </p:nvSpPr>
+        <p:spPr>
+          <a:xfrm>
+            <a:off x="9432590" y="2551834"/>
+            <a:ext cx="1828800" cy="1828800"/>
+          </a:xfrm>
+          <a:prstGeom prst="rect">
+            <a:avLst/>
+          </a:prstGeom>
+        </p:spPr>
+        <p:style>
+          <a:lnRef idx="2">
+            <a:schemeClr val="accent1">
+              <a:shade val="50000"/>
+            </a:schemeClr>
+          </a:lnRef>
+          <a:fillRef idx="1">
+            <a:schemeClr val="accent1"/>
+          </a:fillRef>
+          <a:effectRef idx="0">
+            <a:schemeClr val="accent1"/>
+          </a:effectRef>
+          <a:fontRef idx="minor">
+            <a:schemeClr val="lt1"/>
+          </a:fontRef>
+        </p:style>
+        <p:txBody>
+          <a:bodyPr rtlCol="0" anchor="t"/>
+          <a:lstStyle/>
+          <a:p>
+            <a:pPr algn="ctr"/>
+            <a:r>
+              <a:rPr lang="en-US" sz="1400" dirty="0" err="1"/>
+              <a:t>RPi</a:t>
+            </a:r>
+            <a:r>
+              <a:rPr lang="en-US" sz="1400" dirty="0"/>
+              <a:t> Hat</a:t>
+            </a:r>
+          </a:p>
+        </p:txBody>
+      </p:sp>
+      <p:sp>
+        <p:nvSpPr>
+          <p:cNvPr id="8" name="Arrow: Curved Down 7">
+            <a:extLst>
+              <a:ext uri="{FF2B5EF4-FFF2-40B4-BE49-F238E27FC236}">
+                <a16:creationId xmlns:a16="http://schemas.microsoft.com/office/drawing/2014/main" id="{587FACE0-9E4C-49C0-9FDE-29E05165BC45}"/>
+              </a:ext>
+            </a:extLst>
+          </p:cNvPr>
+          <p:cNvSpPr/>
+          <p:nvPr/>
+        </p:nvSpPr>
+        <p:spPr>
+          <a:xfrm>
+            <a:off x="7899625" y="3127817"/>
+            <a:ext cx="1842247" cy="676835"/>
+          </a:xfrm>
+          <a:prstGeom prst="curvedDownArrow">
+            <a:avLst/>
+          </a:prstGeom>
+        </p:spPr>
+        <p:style>
+          <a:lnRef idx="2">
+            <a:schemeClr val="accent1">
+              <a:shade val="50000"/>
+            </a:schemeClr>
+          </a:lnRef>
+          <a:fillRef idx="1">
+            <a:schemeClr val="accent1"/>
+          </a:fillRef>
+          <a:effectRef idx="0">
+            <a:schemeClr val="accent1"/>
+          </a:effectRef>
+          <a:fontRef idx="minor">
+            <a:schemeClr val="lt1"/>
+          </a:fontRef>
+        </p:style>
+        <p:txBody>
+          <a:bodyPr rtlCol="0" anchor="ctr"/>
+          <a:lstStyle/>
+          <a:p>
+            <a:pPr algn="ctr"/>
+            <a:endParaRPr lang="en-US">
+              <a:solidFill>
+                <a:schemeClr val="tx1"/>
+              </a:solidFill>
+            </a:endParaRPr>
+          </a:p>
+        </p:txBody>
+      </p:sp>
+      <p:sp>
+        <p:nvSpPr>
+          <p:cNvPr id="10" name="Rectangle 9">
+            <a:extLst>
+              <a:ext uri="{FF2B5EF4-FFF2-40B4-BE49-F238E27FC236}">
+                <a16:creationId xmlns:a16="http://schemas.microsoft.com/office/drawing/2014/main" id="{BF8C1749-B893-4306-B6CE-3D9593276D72}"/>
+              </a:ext>
+            </a:extLst>
+          </p:cNvPr>
+          <p:cNvSpPr/>
+          <p:nvPr/>
+        </p:nvSpPr>
+        <p:spPr>
+          <a:xfrm>
+            <a:off x="640455" y="1059665"/>
+            <a:ext cx="1828800" cy="731520"/>
+          </a:xfrm>
+          <a:prstGeom prst="rect">
+            <a:avLst/>
+          </a:prstGeom>
+        </p:spPr>
+        <p:style>
+          <a:lnRef idx="2">
+            <a:schemeClr val="accent1">
+              <a:shade val="50000"/>
+            </a:schemeClr>
+          </a:lnRef>
+          <a:fillRef idx="1">
+            <a:schemeClr val="accent1"/>
+          </a:fillRef>
+          <a:effectRef idx="0">
+            <a:schemeClr val="accent1"/>
+          </a:effectRef>
+          <a:fontRef idx="minor">
+            <a:schemeClr val="lt1"/>
+          </a:fontRef>
+        </p:style>
+        <p:txBody>
+          <a:bodyPr rtlCol="0" anchor="ctr"/>
+          <a:lstStyle/>
+          <a:p>
+            <a:pPr algn="ctr"/>
+            <a:r>
+              <a:rPr lang="en-US" sz="1400" dirty="0"/>
+              <a:t>GPS Serial Data</a:t>
+            </a:r>
+          </a:p>
+        </p:txBody>
+      </p:sp>
+      <p:sp>
+        <p:nvSpPr>
+          <p:cNvPr id="11" name="Rectangle 10">
+            <a:extLst>
+              <a:ext uri="{FF2B5EF4-FFF2-40B4-BE49-F238E27FC236}">
+                <a16:creationId xmlns:a16="http://schemas.microsoft.com/office/drawing/2014/main" id="{A07414CC-2A94-4287-9EBF-740A6A76B8D6}"/>
+              </a:ext>
+            </a:extLst>
+          </p:cNvPr>
+          <p:cNvSpPr/>
+          <p:nvPr/>
+        </p:nvSpPr>
+        <p:spPr>
+          <a:xfrm>
+            <a:off x="640455" y="2172403"/>
+            <a:ext cx="1828800" cy="731520"/>
+          </a:xfrm>
+          <a:prstGeom prst="rect">
+            <a:avLst/>
+          </a:prstGeom>
+        </p:spPr>
+        <p:style>
+          <a:lnRef idx="2">
+            <a:schemeClr val="accent1">
+              <a:shade val="50000"/>
+            </a:schemeClr>
+          </a:lnRef>
+          <a:fillRef idx="1">
+            <a:schemeClr val="accent1"/>
+          </a:fillRef>
+          <a:effectRef idx="0">
+            <a:schemeClr val="accent1"/>
+          </a:effectRef>
+          <a:fontRef idx="minor">
+            <a:schemeClr val="lt1"/>
+          </a:fontRef>
+        </p:style>
+        <p:txBody>
+          <a:bodyPr rtlCol="0" anchor="ctr"/>
+          <a:lstStyle/>
+          <a:p>
+            <a:pPr algn="ctr"/>
+            <a:r>
+              <a:rPr lang="en-US" sz="1400" dirty="0"/>
+              <a:t>BPS Serial Data</a:t>
+            </a:r>
+          </a:p>
+        </p:txBody>
+      </p:sp>
+      <p:sp>
+        <p:nvSpPr>
+          <p:cNvPr id="12" name="Rectangle 11">
+            <a:extLst>
+              <a:ext uri="{FF2B5EF4-FFF2-40B4-BE49-F238E27FC236}">
+                <a16:creationId xmlns:a16="http://schemas.microsoft.com/office/drawing/2014/main" id="{8D97A371-B884-479E-9C15-F1BD38D1C41D}"/>
+              </a:ext>
+            </a:extLst>
+          </p:cNvPr>
+          <p:cNvSpPr/>
+          <p:nvPr/>
+        </p:nvSpPr>
+        <p:spPr>
+          <a:xfrm>
+            <a:off x="640455" y="4068248"/>
+            <a:ext cx="1828800" cy="731520"/>
+          </a:xfrm>
+          <a:prstGeom prst="rect">
+            <a:avLst/>
+          </a:prstGeom>
+        </p:spPr>
+        <p:style>
+          <a:lnRef idx="2">
+            <a:schemeClr val="accent1">
+              <a:shade val="50000"/>
+            </a:schemeClr>
+          </a:lnRef>
+          <a:fillRef idx="1">
+            <a:schemeClr val="accent1"/>
+          </a:fillRef>
+          <a:effectRef idx="0">
+            <a:schemeClr val="accent1"/>
+          </a:effectRef>
+          <a:fontRef idx="minor">
+            <a:schemeClr val="lt1"/>
+          </a:fontRef>
+        </p:style>
+        <p:txBody>
+          <a:bodyPr rtlCol="0" anchor="ctr"/>
+          <a:lstStyle/>
+          <a:p>
+            <a:pPr algn="ctr"/>
+            <a:r>
+              <a:rPr lang="en-US" sz="1400" dirty="0"/>
+              <a:t>9DOF I</a:t>
+            </a:r>
+            <a:r>
+              <a:rPr lang="en-US" sz="1400" baseline="30000" dirty="0"/>
+              <a:t>2</a:t>
+            </a:r>
+            <a:r>
+              <a:rPr lang="en-US" sz="1400" dirty="0"/>
+              <a:t>C Data</a:t>
+            </a:r>
+          </a:p>
+        </p:txBody>
+      </p:sp>
+      <p:sp>
+        <p:nvSpPr>
+          <p:cNvPr id="13" name="Rectangle 12">
+            <a:extLst>
+              <a:ext uri="{FF2B5EF4-FFF2-40B4-BE49-F238E27FC236}">
+                <a16:creationId xmlns:a16="http://schemas.microsoft.com/office/drawing/2014/main" id="{D0103367-F924-480D-BB95-FFF7CA6DFFA8}"/>
+              </a:ext>
+            </a:extLst>
+          </p:cNvPr>
+          <p:cNvSpPr/>
+          <p:nvPr/>
+        </p:nvSpPr>
+        <p:spPr>
+          <a:xfrm>
+            <a:off x="640455" y="5165528"/>
+            <a:ext cx="1828800" cy="731520"/>
+          </a:xfrm>
+          <a:prstGeom prst="rect">
+            <a:avLst/>
+          </a:prstGeom>
+        </p:spPr>
+        <p:style>
+          <a:lnRef idx="2">
+            <a:schemeClr val="accent1">
+              <a:shade val="50000"/>
+            </a:schemeClr>
+          </a:lnRef>
+          <a:fillRef idx="1">
+            <a:schemeClr val="accent1"/>
+          </a:fillRef>
+          <a:effectRef idx="0">
+            <a:schemeClr val="accent1"/>
+          </a:effectRef>
+          <a:fontRef idx="minor">
+            <a:schemeClr val="lt1"/>
+          </a:fontRef>
+        </p:style>
+        <p:txBody>
+          <a:bodyPr rtlCol="0" anchor="ctr"/>
+          <a:lstStyle/>
+          <a:p>
+            <a:pPr algn="ctr"/>
+            <a:r>
+              <a:rPr lang="en-US" sz="1400" dirty="0"/>
+              <a:t>Luminosity I</a:t>
+            </a:r>
+            <a:r>
+              <a:rPr lang="en-US" sz="1400" baseline="30000" dirty="0"/>
+              <a:t>2</a:t>
+            </a:r>
+            <a:r>
+              <a:rPr lang="en-US" sz="1400" dirty="0"/>
+              <a:t>C Data</a:t>
+            </a:r>
+          </a:p>
+        </p:txBody>
+      </p:sp>
+      <p:sp>
+        <p:nvSpPr>
+          <p:cNvPr id="17" name="Arrow: Right 16">
+            <a:extLst>
+              <a:ext uri="{FF2B5EF4-FFF2-40B4-BE49-F238E27FC236}">
+                <a16:creationId xmlns:a16="http://schemas.microsoft.com/office/drawing/2014/main" id="{99DDE779-6C20-42D9-8F76-6C0FF1AABE49}"/>
+              </a:ext>
+            </a:extLst>
+          </p:cNvPr>
+          <p:cNvSpPr/>
+          <p:nvPr/>
+        </p:nvSpPr>
+        <p:spPr>
+          <a:xfrm>
+            <a:off x="2469255" y="1265449"/>
+            <a:ext cx="1638300" cy="271463"/>
+          </a:xfrm>
+          <a:prstGeom prst="rightArrow">
+            <a:avLst/>
+          </a:prstGeom>
+          <a:solidFill>
+            <a:schemeClr val="tx1"/>
+          </a:solidFill>
+        </p:spPr>
+        <p:style>
+          <a:lnRef idx="2">
+            <a:schemeClr val="accent1">
+              <a:shade val="50000"/>
+            </a:schemeClr>
+          </a:lnRef>
+          <a:fillRef idx="1">
+            <a:schemeClr val="accent1"/>
+          </a:fillRef>
+          <a:effectRef idx="0">
+            <a:schemeClr val="accent1"/>
+          </a:effectRef>
+          <a:fontRef idx="minor">
+            <a:schemeClr val="lt1"/>
+          </a:fontRef>
+        </p:style>
+        <p:txBody>
+          <a:bodyPr rtlCol="0" anchor="ctr"/>
+          <a:lstStyle/>
+          <a:p>
+            <a:pPr algn="ctr"/>
+            <a:endParaRPr lang="en-US"/>
+          </a:p>
+        </p:txBody>
+      </p:sp>
+      <p:sp>
+        <p:nvSpPr>
+          <p:cNvPr id="18" name="Arrow: Right 17">
+            <a:extLst>
+              <a:ext uri="{FF2B5EF4-FFF2-40B4-BE49-F238E27FC236}">
+                <a16:creationId xmlns:a16="http://schemas.microsoft.com/office/drawing/2014/main" id="{E28492D0-0DE3-46D8-980B-5B759FCAD056}"/>
+              </a:ext>
+            </a:extLst>
+          </p:cNvPr>
+          <p:cNvSpPr/>
+          <p:nvPr/>
+        </p:nvSpPr>
+        <p:spPr>
+          <a:xfrm>
+            <a:off x="2469255" y="2402431"/>
+            <a:ext cx="1638300" cy="271463"/>
+          </a:xfrm>
+          <a:prstGeom prst="rightArrow">
+            <a:avLst/>
+          </a:prstGeom>
+          <a:solidFill>
+            <a:schemeClr val="tx1"/>
+          </a:solidFill>
+        </p:spPr>
+        <p:style>
+          <a:lnRef idx="2">
+            <a:schemeClr val="accent1">
+              <a:shade val="50000"/>
+            </a:schemeClr>
+          </a:lnRef>
+          <a:fillRef idx="1">
+            <a:schemeClr val="accent1"/>
+          </a:fillRef>
+          <a:effectRef idx="0">
+            <a:schemeClr val="accent1"/>
+          </a:effectRef>
+          <a:fontRef idx="minor">
+            <a:schemeClr val="lt1"/>
+          </a:fontRef>
+        </p:style>
+        <p:txBody>
+          <a:bodyPr rtlCol="0" anchor="ctr"/>
+          <a:lstStyle/>
+          <a:p>
+            <a:pPr algn="ctr"/>
+            <a:endParaRPr lang="en-US"/>
+          </a:p>
+        </p:txBody>
+      </p:sp>
+      <p:sp>
+        <p:nvSpPr>
+          <p:cNvPr id="21" name="Rectangle 20">
+            <a:extLst>
+              <a:ext uri="{FF2B5EF4-FFF2-40B4-BE49-F238E27FC236}">
+                <a16:creationId xmlns:a16="http://schemas.microsoft.com/office/drawing/2014/main" id="{D0FEB196-D157-4783-954C-C9C901230B7E}"/>
+              </a:ext>
+            </a:extLst>
+          </p:cNvPr>
+          <p:cNvSpPr>
+            <a:spLocks noChangeAspect="1"/>
+          </p:cNvSpPr>
+          <p:nvPr/>
+        </p:nvSpPr>
+        <p:spPr>
+          <a:xfrm>
+            <a:off x="4336155" y="1365470"/>
+            <a:ext cx="1371600" cy="1371600"/>
+          </a:xfrm>
+          <a:prstGeom prst="rect">
+            <a:avLst/>
+          </a:prstGeom>
+          <a:solidFill>
+            <a:schemeClr val="accent2"/>
+          </a:solidFill>
+        </p:spPr>
+        <p:style>
+          <a:lnRef idx="2">
+            <a:schemeClr val="accent1">
+              <a:shade val="50000"/>
+            </a:schemeClr>
+          </a:lnRef>
+          <a:fillRef idx="1">
+            <a:schemeClr val="accent1"/>
+          </a:fillRef>
+          <a:effectRef idx="0">
+            <a:schemeClr val="accent1"/>
+          </a:effectRef>
+          <a:fontRef idx="minor">
+            <a:schemeClr val="lt1"/>
+          </a:fontRef>
+        </p:style>
+        <p:txBody>
+          <a:bodyPr rtlCol="0" anchor="ctr"/>
+          <a:lstStyle/>
+          <a:p>
+            <a:pPr algn="ctr"/>
+            <a:r>
+              <a:rPr lang="en-US" sz="1400" dirty="0"/>
+              <a:t>STM Nucleo</a:t>
+            </a:r>
+          </a:p>
+        </p:txBody>
+      </p:sp>
+      <p:sp>
+        <p:nvSpPr>
+          <p:cNvPr id="22" name="Rectangle 21">
+            <a:extLst>
+              <a:ext uri="{FF2B5EF4-FFF2-40B4-BE49-F238E27FC236}">
+                <a16:creationId xmlns:a16="http://schemas.microsoft.com/office/drawing/2014/main" id="{4CA044F5-9665-4CC7-8AA4-AAC1E3B41EA7}"/>
+              </a:ext>
+            </a:extLst>
+          </p:cNvPr>
+          <p:cNvSpPr>
+            <a:spLocks noChangeAspect="1"/>
+          </p:cNvSpPr>
+          <p:nvPr/>
+        </p:nvSpPr>
+        <p:spPr>
+          <a:xfrm>
+            <a:off x="4336155" y="4380634"/>
+            <a:ext cx="1371600" cy="1371600"/>
+          </a:xfrm>
+          <a:prstGeom prst="rect">
+            <a:avLst/>
+          </a:prstGeom>
+          <a:solidFill>
+            <a:schemeClr val="accent2"/>
+          </a:solidFill>
+        </p:spPr>
+        <p:style>
+          <a:lnRef idx="2">
+            <a:schemeClr val="accent1">
+              <a:shade val="50000"/>
+            </a:schemeClr>
+          </a:lnRef>
+          <a:fillRef idx="1">
+            <a:schemeClr val="accent1"/>
+          </a:fillRef>
+          <a:effectRef idx="0">
+            <a:schemeClr val="accent1"/>
+          </a:effectRef>
+          <a:fontRef idx="minor">
+            <a:schemeClr val="lt1"/>
+          </a:fontRef>
+        </p:style>
+        <p:txBody>
+          <a:bodyPr rtlCol="0" anchor="ctr"/>
+          <a:lstStyle/>
+          <a:p>
+            <a:pPr algn="ctr"/>
+            <a:r>
+              <a:rPr lang="en-US" sz="1400" dirty="0"/>
+              <a:t>STM Nucleo</a:t>
+            </a:r>
+          </a:p>
+        </p:txBody>
+      </p:sp>
+      <p:sp>
+        <p:nvSpPr>
+          <p:cNvPr id="23" name="Rectangle 22">
+            <a:extLst>
+              <a:ext uri="{FF2B5EF4-FFF2-40B4-BE49-F238E27FC236}">
+                <a16:creationId xmlns:a16="http://schemas.microsoft.com/office/drawing/2014/main" id="{F4F62553-13D9-4F7A-932B-7B70F00E9183}"/>
+              </a:ext>
+            </a:extLst>
+          </p:cNvPr>
+          <p:cNvSpPr>
+            <a:spLocks noChangeAspect="1"/>
+          </p:cNvSpPr>
+          <p:nvPr/>
+        </p:nvSpPr>
+        <p:spPr>
+          <a:xfrm>
+            <a:off x="9661190" y="2859944"/>
+            <a:ext cx="1371600" cy="1371600"/>
+          </a:xfrm>
+          <a:prstGeom prst="rect">
+            <a:avLst/>
+          </a:prstGeom>
+          <a:solidFill>
+            <a:schemeClr val="accent2"/>
+          </a:solidFill>
+        </p:spPr>
+        <p:style>
+          <a:lnRef idx="2">
+            <a:schemeClr val="accent1">
+              <a:shade val="50000"/>
+            </a:schemeClr>
+          </a:lnRef>
+          <a:fillRef idx="1">
+            <a:schemeClr val="accent1"/>
+          </a:fillRef>
+          <a:effectRef idx="0">
+            <a:schemeClr val="accent1"/>
+          </a:effectRef>
+          <a:fontRef idx="minor">
+            <a:schemeClr val="lt1"/>
+          </a:fontRef>
+        </p:style>
+        <p:txBody>
+          <a:bodyPr rtlCol="0" anchor="ctr"/>
+          <a:lstStyle/>
+          <a:p>
+            <a:pPr algn="ctr"/>
+            <a:r>
+              <a:rPr lang="en-US" sz="1400" dirty="0"/>
+              <a:t>Raspberry Pi 3</a:t>
+            </a:r>
+          </a:p>
+        </p:txBody>
+      </p:sp>
+      <p:sp>
+        <p:nvSpPr>
+          <p:cNvPr id="24" name="Arrow: Right 23">
+            <a:extLst>
+              <a:ext uri="{FF2B5EF4-FFF2-40B4-BE49-F238E27FC236}">
+                <a16:creationId xmlns:a16="http://schemas.microsoft.com/office/drawing/2014/main" id="{1859A5C6-0310-4802-972D-BDADB58272E5}"/>
+              </a:ext>
+            </a:extLst>
+          </p:cNvPr>
+          <p:cNvSpPr/>
+          <p:nvPr/>
+        </p:nvSpPr>
+        <p:spPr>
+          <a:xfrm>
+            <a:off x="2469255" y="4322519"/>
+            <a:ext cx="1638300" cy="271463"/>
+          </a:xfrm>
+          <a:prstGeom prst="rightArrow">
+            <a:avLst/>
+          </a:prstGeom>
+          <a:solidFill>
+            <a:schemeClr val="tx1"/>
+          </a:solidFill>
+        </p:spPr>
+        <p:style>
+          <a:lnRef idx="2">
+            <a:schemeClr val="accent1">
+              <a:shade val="50000"/>
+            </a:schemeClr>
+          </a:lnRef>
+          <a:fillRef idx="1">
+            <a:schemeClr val="accent1"/>
+          </a:fillRef>
+          <a:effectRef idx="0">
+            <a:schemeClr val="accent1"/>
+          </a:effectRef>
+          <a:fontRef idx="minor">
+            <a:schemeClr val="lt1"/>
+          </a:fontRef>
+        </p:style>
+        <p:txBody>
+          <a:bodyPr rtlCol="0" anchor="ctr"/>
+          <a:lstStyle/>
+          <a:p>
+            <a:pPr algn="ctr"/>
+            <a:endParaRPr lang="en-US"/>
+          </a:p>
+        </p:txBody>
+      </p:sp>
+      <p:sp>
+        <p:nvSpPr>
+          <p:cNvPr id="27" name="Title 3">
+            <a:extLst>
+              <a:ext uri="{FF2B5EF4-FFF2-40B4-BE49-F238E27FC236}">
+                <a16:creationId xmlns:a16="http://schemas.microsoft.com/office/drawing/2014/main" id="{4A12E4C1-69F1-42A0-9A83-0744EF24EE3C}"/>
+              </a:ext>
+            </a:extLst>
+          </p:cNvPr>
+          <p:cNvSpPr>
+            <a:spLocks noGrp="1"/>
+          </p:cNvSpPr>
+          <p:nvPr>
+            <p:ph type="title"/>
+          </p:nvPr>
+        </p:nvSpPr>
+        <p:spPr>
+          <a:xfrm>
+            <a:off x="838200" y="365125"/>
+            <a:ext cx="10515600" cy="478937"/>
+          </a:xfrm>
+        </p:spPr>
+        <p:txBody>
+          <a:bodyPr>
+            <a:noAutofit/>
+          </a:bodyPr>
+          <a:lstStyle/>
+          <a:p>
+            <a:r>
+              <a:rPr lang="en-US" sz="3200" dirty="0"/>
+              <a:t>Open House In-Car Structure</a:t>
+            </a:r>
+          </a:p>
+        </p:txBody>
+      </p:sp>
+      <p:sp>
+        <p:nvSpPr>
+          <p:cNvPr id="30" name="Callout: Line 29">
+            <a:extLst>
+              <a:ext uri="{FF2B5EF4-FFF2-40B4-BE49-F238E27FC236}">
+                <a16:creationId xmlns:a16="http://schemas.microsoft.com/office/drawing/2014/main" id="{02601EC3-65E1-4C3D-A38B-E8A713A7C0BB}"/>
+              </a:ext>
+            </a:extLst>
+          </p:cNvPr>
+          <p:cNvSpPr/>
+          <p:nvPr/>
+        </p:nvSpPr>
+        <p:spPr>
+          <a:xfrm>
+            <a:off x="10346990" y="1080429"/>
+            <a:ext cx="1272988" cy="807974"/>
+          </a:xfrm>
+          <a:prstGeom prst="borderCallout1">
+            <a:avLst>
+              <a:gd name="adj1" fmla="val 76446"/>
+              <a:gd name="adj2" fmla="val -5868"/>
+              <a:gd name="adj3" fmla="val 180181"/>
+              <a:gd name="adj4" fmla="val -12981"/>
+            </a:avLst>
+          </a:prstGeom>
+          <a:ln>
+            <a:prstDash val="solid"/>
+          </a:ln>
+        </p:spPr>
+        <p:style>
+          <a:lnRef idx="2">
+            <a:schemeClr val="accent1">
+              <a:shade val="50000"/>
+            </a:schemeClr>
+          </a:lnRef>
+          <a:fillRef idx="1">
+            <a:schemeClr val="accent1"/>
+          </a:fillRef>
+          <a:effectRef idx="0">
+            <a:schemeClr val="accent1"/>
+          </a:effectRef>
+          <a:fontRef idx="minor">
+            <a:schemeClr val="lt1"/>
+          </a:fontRef>
+        </p:style>
+        <p:txBody>
+          <a:bodyPr rtlCol="0" anchor="ctr"/>
+          <a:lstStyle/>
+          <a:p>
+            <a:pPr algn="ctr"/>
+            <a:r>
+              <a:rPr lang="en-US" sz="1400" dirty="0"/>
+              <a:t>Send UDP over Ethernet</a:t>
+            </a:r>
+          </a:p>
+        </p:txBody>
+      </p:sp>
+    </p:spTree>
+    <p:extLst>
+      <p:ext uri="{BB962C8B-B14F-4D97-AF65-F5344CB8AC3E}">
+        <p14:creationId xmlns:p14="http://schemas.microsoft.com/office/powerpoint/2010/main" val="3620349038"/>
+      </p:ext>
+    </p:extLst>
+  </p:cSld>
+  <p:clrMapOvr>
+    <a:masterClrMapping/>
+  </p:clrMapOvr>
+</p:sld>
+</file>
+
 <file path=ppt/theme/theme1.xml><?xml version="1.0" encoding="utf-8"?>
 <a:theme xmlns:a="http://schemas.openxmlformats.org/drawingml/2006/main" name="Office Theme">
   <a:themeElements>
@@ -5530,7 +6573,33 @@
       </a:bgFillStyleLst>
     </a:fmtScheme>
   </a:themeElements>
-  <a:objectDefaults/>
+  <a:objectDefaults>
+    <a:spDef>
+      <a:spPr/>
+      <a:bodyPr rtlCol="0" anchor="t"/>
+      <a:lstStyle>
+        <a:defPPr algn="ctr">
+          <a:defRPr sz="1400" dirty="0"/>
+        </a:defPPr>
+      </a:lstStyle>
+      <a:style>
+        <a:lnRef idx="2">
+          <a:schemeClr val="accent1">
+            <a:shade val="50000"/>
+          </a:schemeClr>
+        </a:lnRef>
+        <a:fillRef idx="1">
+          <a:schemeClr val="accent1"/>
+        </a:fillRef>
+        <a:effectRef idx="0">
+          <a:schemeClr val="accent1"/>
+        </a:effectRef>
+        <a:fontRef idx="minor">
+          <a:schemeClr val="lt1"/>
+        </a:fontRef>
+      </a:style>
+    </a:spDef>
+  </a:objectDefaults>
   <a:extraClrSchemeLst/>
   <a:extLst>
     <a:ext uri="{05A4C25C-085E-4340-85A3-A5531E510DB2}">

</xml_diff>

<commit_message>
made more flow diagrams
</commit_message>
<xml_diff>
--- a/new_acquisition/nucleo data flow and sw structure.pptx
+++ b/new_acquisition/nucleo data flow and sw structure.pptx
@@ -264,7 +264,7 @@
           <a:p>
             <a:fld id="{952D8749-70C6-48E7-AB63-DFF662370668}" type="datetimeFigureOut">
               <a:rPr lang="en-US" smtClean="0"/>
-              <a:t>10/11/2017</a:t>
+              <a:t>10/29/2017</a:t>
             </a:fld>
             <a:endParaRPr lang="en-US" dirty="0"/>
           </a:p>
@@ -462,7 +462,7 @@
           <a:p>
             <a:fld id="{952D8749-70C6-48E7-AB63-DFF662370668}" type="datetimeFigureOut">
               <a:rPr lang="en-US" smtClean="0"/>
-              <a:t>10/11/2017</a:t>
+              <a:t>10/29/2017</a:t>
             </a:fld>
             <a:endParaRPr lang="en-US" dirty="0"/>
           </a:p>
@@ -670,7 +670,7 @@
           <a:p>
             <a:fld id="{952D8749-70C6-48E7-AB63-DFF662370668}" type="datetimeFigureOut">
               <a:rPr lang="en-US" smtClean="0"/>
-              <a:t>10/11/2017</a:t>
+              <a:t>10/29/2017</a:t>
             </a:fld>
             <a:endParaRPr lang="en-US" dirty="0"/>
           </a:p>
@@ -868,7 +868,7 @@
           <a:p>
             <a:fld id="{952D8749-70C6-48E7-AB63-DFF662370668}" type="datetimeFigureOut">
               <a:rPr lang="en-US" smtClean="0"/>
-              <a:t>10/11/2017</a:t>
+              <a:t>10/29/2017</a:t>
             </a:fld>
             <a:endParaRPr lang="en-US" dirty="0"/>
           </a:p>
@@ -1143,7 +1143,7 @@
           <a:p>
             <a:fld id="{952D8749-70C6-48E7-AB63-DFF662370668}" type="datetimeFigureOut">
               <a:rPr lang="en-US" smtClean="0"/>
-              <a:t>10/11/2017</a:t>
+              <a:t>10/29/2017</a:t>
             </a:fld>
             <a:endParaRPr lang="en-US" dirty="0"/>
           </a:p>
@@ -1408,7 +1408,7 @@
           <a:p>
             <a:fld id="{952D8749-70C6-48E7-AB63-DFF662370668}" type="datetimeFigureOut">
               <a:rPr lang="en-US" smtClean="0"/>
-              <a:t>10/11/2017</a:t>
+              <a:t>10/29/2017</a:t>
             </a:fld>
             <a:endParaRPr lang="en-US" dirty="0"/>
           </a:p>
@@ -1820,7 +1820,7 @@
           <a:p>
             <a:fld id="{952D8749-70C6-48E7-AB63-DFF662370668}" type="datetimeFigureOut">
               <a:rPr lang="en-US" smtClean="0"/>
-              <a:t>10/11/2017</a:t>
+              <a:t>10/29/2017</a:t>
             </a:fld>
             <a:endParaRPr lang="en-US" dirty="0"/>
           </a:p>
@@ -1961,7 +1961,7 @@
           <a:p>
             <a:fld id="{952D8749-70C6-48E7-AB63-DFF662370668}" type="datetimeFigureOut">
               <a:rPr lang="en-US" smtClean="0"/>
-              <a:t>10/11/2017</a:t>
+              <a:t>10/29/2017</a:t>
             </a:fld>
             <a:endParaRPr lang="en-US" dirty="0"/>
           </a:p>
@@ -2074,7 +2074,7 @@
           <a:p>
             <a:fld id="{952D8749-70C6-48E7-AB63-DFF662370668}" type="datetimeFigureOut">
               <a:rPr lang="en-US" smtClean="0"/>
-              <a:t>10/11/2017</a:t>
+              <a:t>10/29/2017</a:t>
             </a:fld>
             <a:endParaRPr lang="en-US" dirty="0"/>
           </a:p>
@@ -2385,7 +2385,7 @@
           <a:p>
             <a:fld id="{952D8749-70C6-48E7-AB63-DFF662370668}" type="datetimeFigureOut">
               <a:rPr lang="en-US" smtClean="0"/>
-              <a:t>10/11/2017</a:t>
+              <a:t>10/29/2017</a:t>
             </a:fld>
             <a:endParaRPr lang="en-US" dirty="0"/>
           </a:p>
@@ -2673,7 +2673,7 @@
           <a:p>
             <a:fld id="{952D8749-70C6-48E7-AB63-DFF662370668}" type="datetimeFigureOut">
               <a:rPr lang="en-US" smtClean="0"/>
-              <a:t>10/11/2017</a:t>
+              <a:t>10/29/2017</a:t>
             </a:fld>
             <a:endParaRPr lang="en-US" dirty="0"/>
           </a:p>
@@ -2914,7 +2914,7 @@
           <a:p>
             <a:fld id="{952D8749-70C6-48E7-AB63-DFF662370668}" type="datetimeFigureOut">
               <a:rPr lang="en-US" smtClean="0"/>
-              <a:t>10/11/2017</a:t>
+              <a:t>10/29/2017</a:t>
             </a:fld>
             <a:endParaRPr lang="en-US" dirty="0"/>
           </a:p>
@@ -3361,7 +3361,7 @@
           <a:p>
             <a:r>
               <a:rPr lang="en-US" sz="3200" dirty="0"/>
-              <a:t>Nucleo Sensor Data S/W Structure</a:t>
+              <a:t>Nucleo Acquisition S/W Structure</a:t>
             </a:r>
           </a:p>
         </p:txBody>
@@ -3482,8 +3482,8 @@
         </p:nvSpPr>
         <p:spPr>
           <a:xfrm rot="10800000">
-            <a:off x="398551" y="5303565"/>
-            <a:ext cx="1661537" cy="991370"/>
+            <a:off x="398550" y="5590531"/>
+            <a:ext cx="1661537" cy="704404"/>
           </a:xfrm>
           <a:prstGeom prst="curvedDownArrow">
             <a:avLst/>
@@ -3533,7 +3533,7 @@
         <p:spPr>
           <a:xfrm>
             <a:off x="498225" y="2596661"/>
-            <a:ext cx="1661537" cy="991370"/>
+            <a:ext cx="1661537" cy="815313"/>
           </a:xfrm>
           <a:prstGeom prst="curvedDownArrow">
             <a:avLst/>
@@ -3570,55 +3570,6 @@
       </p:sp>
       <p:sp>
         <p:nvSpPr>
-          <p:cNvPr id="10" name="Rectangle 9">
-            <a:extLst>
-              <a:ext uri="{FF2B5EF4-FFF2-40B4-BE49-F238E27FC236}">
-                <a16:creationId xmlns:a16="http://schemas.microsoft.com/office/drawing/2014/main" id="{4DE9CD2F-89AC-402E-BB6B-1501B1895A54}"/>
-              </a:ext>
-            </a:extLst>
-          </p:cNvPr>
-          <p:cNvSpPr/>
-          <p:nvPr/>
-        </p:nvSpPr>
-        <p:spPr>
-          <a:xfrm>
-            <a:off x="451167" y="3753693"/>
-            <a:ext cx="1539847" cy="1527079"/>
-          </a:xfrm>
-          <a:prstGeom prst="rect">
-            <a:avLst/>
-          </a:prstGeom>
-        </p:spPr>
-        <p:style>
-          <a:lnRef idx="2">
-            <a:schemeClr val="accent2">
-              <a:shade val="50000"/>
-            </a:schemeClr>
-          </a:lnRef>
-          <a:fillRef idx="1">
-            <a:schemeClr val="accent2"/>
-          </a:fillRef>
-          <a:effectRef idx="0">
-            <a:schemeClr val="accent2"/>
-          </a:effectRef>
-          <a:fontRef idx="minor">
-            <a:schemeClr val="lt1"/>
-          </a:fontRef>
-        </p:style>
-        <p:txBody>
-          <a:bodyPr rtlCol="0" anchor="ctr"/>
-          <a:lstStyle/>
-          <a:p>
-            <a:pPr algn="ctr"/>
-            <a:r>
-              <a:rPr lang="en-US" sz="1400" dirty="0"/>
-              <a:t>Internal Sensor Data Acquisition</a:t>
-            </a:r>
-          </a:p>
-        </p:txBody>
-      </p:sp>
-      <p:sp>
-        <p:nvSpPr>
           <p:cNvPr id="11" name="Rectangle 10">
             <a:extLst>
               <a:ext uri="{FF2B5EF4-FFF2-40B4-BE49-F238E27FC236}">
@@ -3917,11 +3868,15 @@
         </p:nvSpPr>
         <p:spPr>
           <a:xfrm>
-            <a:off x="2894983" y="2971613"/>
-            <a:ext cx="1554204" cy="914597"/>
+            <a:off x="2894983" y="2971614"/>
+            <a:ext cx="1554204" cy="381957"/>
           </a:xfrm>
           <a:prstGeom prst="curvedDownArrow">
-            <a:avLst/>
+            <a:avLst>
+              <a:gd name="adj1" fmla="val 32994"/>
+              <a:gd name="adj2" fmla="val 88519"/>
+              <a:gd name="adj3" fmla="val 42976"/>
+            </a:avLst>
           </a:prstGeom>
         </p:spPr>
         <p:style>
@@ -3955,73 +3910,6 @@
       </p:sp>
       <p:sp>
         <p:nvSpPr>
-          <p:cNvPr id="18" name="Rectangle 17">
-            <a:extLst>
-              <a:ext uri="{FF2B5EF4-FFF2-40B4-BE49-F238E27FC236}">
-                <a16:creationId xmlns:a16="http://schemas.microsoft.com/office/drawing/2014/main" id="{84BB9153-2594-4827-BD81-D2ABB2C7E645}"/>
-              </a:ext>
-            </a:extLst>
-          </p:cNvPr>
-          <p:cNvSpPr/>
-          <p:nvPr/>
-        </p:nvSpPr>
-        <p:spPr>
-          <a:xfrm>
-            <a:off x="2955082" y="3979799"/>
-            <a:ext cx="1440375" cy="1408821"/>
-          </a:xfrm>
-          <a:prstGeom prst="rect">
-            <a:avLst/>
-          </a:prstGeom>
-        </p:spPr>
-        <p:style>
-          <a:lnRef idx="2">
-            <a:schemeClr val="accent2">
-              <a:shade val="50000"/>
-            </a:schemeClr>
-          </a:lnRef>
-          <a:fillRef idx="1">
-            <a:schemeClr val="accent2"/>
-          </a:fillRef>
-          <a:effectRef idx="0">
-            <a:schemeClr val="accent2"/>
-          </a:effectRef>
-          <a:fontRef idx="minor">
-            <a:schemeClr val="lt1"/>
-          </a:fontRef>
-        </p:style>
-        <p:txBody>
-          <a:bodyPr rtlCol="0" anchor="t"/>
-          <a:lstStyle/>
-          <a:p>
-            <a:pPr algn="ctr"/>
-            <a:r>
-              <a:rPr lang="en-US" sz="1400" dirty="0"/>
-              <a:t>External Sensor Data Acquisition</a:t>
-            </a:r>
-          </a:p>
-          <a:p>
-            <a:pPr algn="ctr"/>
-            <a:endParaRPr lang="en-US" sz="1100" dirty="0"/>
-          </a:p>
-          <a:p>
-            <a:pPr algn="ctr"/>
-            <a:r>
-              <a:rPr lang="en-US" sz="1100" dirty="0"/>
-              <a:t>(Timer -&gt; collect data)</a:t>
-            </a:r>
-          </a:p>
-          <a:p>
-            <a:pPr algn="ctr"/>
-            <a:r>
-              <a:rPr lang="en-US" sz="1100" dirty="0"/>
-              <a:t>Sleep Till Timer Event</a:t>
-            </a:r>
-          </a:p>
-        </p:txBody>
-      </p:sp>
-      <p:sp>
-        <p:nvSpPr>
           <p:cNvPr id="19" name="Rectangle 18">
             <a:extLst>
               <a:ext uri="{FF2B5EF4-FFF2-40B4-BE49-F238E27FC236}">
@@ -4064,8 +3952,12 @@
             <a:pPr algn="ctr"/>
             <a:r>
               <a:rPr lang="en-US" sz="1400" dirty="0"/>
-              <a:t>Nucleo Data State Class</a:t>
-            </a:r>
+              <a:t>Sensor Manager Class</a:t>
+            </a:r>
+          </a:p>
+          <a:p>
+            <a:pPr algn="ctr"/>
+            <a:endParaRPr lang="en-US" sz="1400" dirty="0"/>
           </a:p>
         </p:txBody>
       </p:sp>
@@ -4084,7 +3976,7 @@
         <p:spPr>
           <a:xfrm>
             <a:off x="4960697" y="2391507"/>
-            <a:ext cx="1057768" cy="1145309"/>
+            <a:ext cx="1057768" cy="1648363"/>
           </a:xfrm>
           <a:prstGeom prst="rect">
             <a:avLst/>
@@ -4120,13 +4012,6 @@
           </a:p>
           <a:p>
             <a:pPr algn="ctr"/>
-            <a:r>
-              <a:rPr lang="en-US" sz="1100" dirty="0"/>
-              <a:t>Sensor Data</a:t>
-            </a:r>
-          </a:p>
-          <a:p>
-            <a:pPr algn="ctr"/>
             <a:endParaRPr lang="en-US" sz="1100" dirty="0"/>
           </a:p>
         </p:txBody>
@@ -4142,20 +4027,17 @@
           </p:cNvPr>
           <p:cNvCxnSpPr>
             <a:cxnSpLocks/>
-            <a:stCxn id="10" idx="2"/>
-            <a:endCxn id="20" idx="1"/>
           </p:cNvCxnSpPr>
           <p:nvPr/>
         </p:nvCxnSpPr>
         <p:spPr>
           <a:xfrm rot="5400000" flipH="1" flipV="1">
-            <a:off x="1932589" y="2252664"/>
-            <a:ext cx="2316610" cy="3739606"/>
-          </a:xfrm>
-          <a:prstGeom prst="bentConnector4">
+            <a:off x="1804234" y="3643599"/>
+            <a:ext cx="3347423" cy="2491611"/>
+          </a:xfrm>
+          <a:prstGeom prst="bentConnector3">
             <a:avLst>
-              <a:gd name="adj1" fmla="val -58954"/>
-              <a:gd name="adj2" fmla="val 92583"/>
+              <a:gd name="adj1" fmla="val -1598"/>
             </a:avLst>
           </a:prstGeom>
           <a:ln>
@@ -4188,15 +4070,15 @@
           </p:cNvPr>
           <p:cNvCxnSpPr>
             <a:cxnSpLocks/>
-            <a:stCxn id="18" idx="3"/>
+            <a:stCxn id="29" idx="3"/>
             <a:endCxn id="20" idx="1"/>
           </p:cNvCxnSpPr>
           <p:nvPr/>
         </p:nvCxnSpPr>
         <p:spPr>
           <a:xfrm flipV="1">
-            <a:off x="4395457" y="2964162"/>
-            <a:ext cx="565240" cy="1720048"/>
+            <a:off x="4479419" y="3215689"/>
+            <a:ext cx="481278" cy="2071427"/>
           </a:xfrm>
           <a:prstGeom prst="bentConnector3">
             <a:avLst>
@@ -4266,52 +4148,11 @@
             <a:pPr algn="ctr"/>
             <a:r>
               <a:rPr lang="en-US" sz="1400" dirty="0"/>
-              <a:t>Data Lock</a:t>
-            </a:r>
-          </a:p>
-        </p:txBody>
-      </p:sp>
-      <p:cxnSp>
-        <p:nvCxnSpPr>
-          <p:cNvPr id="46" name="Straight Arrow Connector 45">
-            <a:extLst>
-              <a:ext uri="{FF2B5EF4-FFF2-40B4-BE49-F238E27FC236}">
-                <a16:creationId xmlns:a16="http://schemas.microsoft.com/office/drawing/2014/main" id="{8B5CBD07-550A-4DBB-B125-2CB74B242BC4}"/>
-              </a:ext>
-            </a:extLst>
-          </p:cNvPr>
-          <p:cNvCxnSpPr>
-            <a:cxnSpLocks/>
-          </p:cNvCxnSpPr>
-          <p:nvPr/>
-        </p:nvCxnSpPr>
-        <p:spPr>
-          <a:xfrm>
-            <a:off x="5511682" y="2842546"/>
-            <a:ext cx="0" cy="243226"/>
-          </a:xfrm>
-          <a:prstGeom prst="straightConnector1">
-            <a:avLst/>
-          </a:prstGeom>
-          <a:ln>
-            <a:tailEnd type="triangle"/>
-          </a:ln>
-        </p:spPr>
-        <p:style>
-          <a:lnRef idx="3">
-            <a:schemeClr val="dk1"/>
-          </a:lnRef>
-          <a:fillRef idx="0">
-            <a:schemeClr val="dk1"/>
-          </a:fillRef>
-          <a:effectRef idx="2">
-            <a:schemeClr val="dk1"/>
-          </a:effectRef>
-          <a:fontRef idx="minor">
-            <a:schemeClr val="tx1"/>
-          </a:fontRef>
-        </p:style>
-      </p:cxnSp>
+              <a:t>Mutex</a:t>
+            </a:r>
+          </a:p>
+        </p:txBody>
+      </p:sp>
       <p:sp>
         <p:nvSpPr>
           <p:cNvPr id="47" name="Rectangle 46">
@@ -4326,8 +4167,8 @@
         </p:nvSpPr>
         <p:spPr>
           <a:xfrm>
-            <a:off x="6447687" y="1084385"/>
-            <a:ext cx="1858114" cy="5249017"/>
+            <a:off x="6447687" y="1084386"/>
+            <a:ext cx="1858114" cy="3523698"/>
           </a:xfrm>
           <a:prstGeom prst="rect">
             <a:avLst/>
@@ -4356,8 +4197,13 @@
             <a:pPr algn="ctr"/>
             <a:r>
               <a:rPr lang="en-US" sz="1400" dirty="0"/>
-              <a:t>CAN Message Creator Thread</a:t>
-            </a:r>
+              <a:t>Sensor </a:t>
+            </a:r>
+            <a:r>
+              <a:rPr lang="en-US" sz="1400" dirty="0" err="1"/>
+              <a:t>ManagerThread</a:t>
+            </a:r>
+            <a:endParaRPr lang="en-US" sz="1400" dirty="0"/>
           </a:p>
           <a:p>
             <a:pPr algn="ctr"/>
@@ -4428,8 +4274,8 @@
         </p:nvSpPr>
         <p:spPr>
           <a:xfrm rot="10800000">
-            <a:off x="6545975" y="5229437"/>
-            <a:ext cx="1661537" cy="991370"/>
+            <a:off x="6557116" y="4039415"/>
+            <a:ext cx="1686342" cy="455230"/>
           </a:xfrm>
           <a:prstGeom prst="curvedDownArrow">
             <a:avLst/>
@@ -4479,7 +4325,7 @@
         <p:spPr>
           <a:xfrm>
             <a:off x="6682148" y="2455867"/>
-            <a:ext cx="1550168" cy="897704"/>
+            <a:ext cx="1550168" cy="407956"/>
           </a:xfrm>
           <a:prstGeom prst="curvedDownArrow">
             <a:avLst/>
@@ -4528,8 +4374,8 @@
         </p:nvSpPr>
         <p:spPr>
           <a:xfrm>
-            <a:off x="6664744" y="3540369"/>
-            <a:ext cx="1511475" cy="1527079"/>
+            <a:off x="6668250" y="2918190"/>
+            <a:ext cx="1511475" cy="1067715"/>
           </a:xfrm>
           <a:prstGeom prst="rect">
             <a:avLst/>
@@ -4592,8 +4438,8 @@
         </p:nvCxnSpPr>
         <p:spPr>
           <a:xfrm>
-            <a:off x="6018465" y="2964162"/>
-            <a:ext cx="646279" cy="1339747"/>
+            <a:off x="6018465" y="3215689"/>
+            <a:ext cx="649785" cy="236359"/>
           </a:xfrm>
           <a:prstGeom prst="bentConnector3">
             <a:avLst/>
@@ -4710,7 +4556,7 @@
             <a:pPr algn="ctr"/>
             <a:r>
               <a:rPr lang="en-US" sz="1400" dirty="0"/>
-              <a:t>Data Lock</a:t>
+              <a:t>Mutex</a:t>
             </a:r>
           </a:p>
         </p:txBody>
@@ -4819,8 +4665,8 @@
         </p:nvSpPr>
         <p:spPr>
           <a:xfrm>
-            <a:off x="10217114" y="1078524"/>
-            <a:ext cx="1858114" cy="4259246"/>
+            <a:off x="10217114" y="1078523"/>
+            <a:ext cx="1858114" cy="4786843"/>
           </a:xfrm>
           <a:prstGeom prst="rect">
             <a:avLst/>
@@ -5156,27 +5002,875 @@
           </a:fontRef>
         </p:style>
       </p:cxnSp>
+      <p:sp>
+        <p:nvSpPr>
+          <p:cNvPr id="101" name="TextBox 100">
+            <a:extLst>
+              <a:ext uri="{FF2B5EF4-FFF2-40B4-BE49-F238E27FC236}">
+                <a16:creationId xmlns:a16="http://schemas.microsoft.com/office/drawing/2014/main" id="{DA0B43C5-2794-429F-B0D7-8756385A445A}"/>
+              </a:ext>
+            </a:extLst>
+          </p:cNvPr>
+          <p:cNvSpPr txBox="1"/>
+          <p:nvPr/>
+        </p:nvSpPr>
+        <p:spPr>
+          <a:xfrm>
+            <a:off x="10477868" y="5865367"/>
+            <a:ext cx="1497581" cy="923330"/>
+          </a:xfrm>
+          <a:prstGeom prst="rect">
+            <a:avLst/>
+          </a:prstGeom>
+          <a:noFill/>
+        </p:spPr>
+        <p:txBody>
+          <a:bodyPr wrap="square" rtlCol="0">
+            <a:spAutoFit/>
+          </a:bodyPr>
+          <a:lstStyle/>
+          <a:p>
+            <a:pPr algn="ctr"/>
+            <a:r>
+              <a:rPr lang="en-US" dirty="0"/>
+              <a:t>Sensor Data Output on CAN BUS</a:t>
+            </a:r>
+          </a:p>
+        </p:txBody>
+      </p:sp>
+      <p:sp>
+        <p:nvSpPr>
+          <p:cNvPr id="2" name="Rectangle 1">
+            <a:extLst>
+              <a:ext uri="{FF2B5EF4-FFF2-40B4-BE49-F238E27FC236}">
+                <a16:creationId xmlns:a16="http://schemas.microsoft.com/office/drawing/2014/main" id="{A80FABF5-A7EF-48F2-9B62-BCF9C208106D}"/>
+              </a:ext>
+            </a:extLst>
+          </p:cNvPr>
+          <p:cNvSpPr/>
+          <p:nvPr/>
+        </p:nvSpPr>
+        <p:spPr>
+          <a:xfrm>
+            <a:off x="4958732" y="4223046"/>
+            <a:ext cx="1062495" cy="285285"/>
+          </a:xfrm>
+          <a:prstGeom prst="rect">
+            <a:avLst/>
+          </a:prstGeom>
+        </p:spPr>
+        <p:style>
+          <a:lnRef idx="2">
+            <a:schemeClr val="accent1">
+              <a:shade val="50000"/>
+            </a:schemeClr>
+          </a:lnRef>
+          <a:fillRef idx="1">
+            <a:schemeClr val="accent1"/>
+          </a:fillRef>
+          <a:effectRef idx="0">
+            <a:schemeClr val="accent1"/>
+          </a:effectRef>
+          <a:fontRef idx="minor">
+            <a:schemeClr val="lt1"/>
+          </a:fontRef>
+        </p:style>
+        <p:txBody>
+          <a:bodyPr rtlCol="0" anchor="t"/>
+          <a:lstStyle/>
+          <a:p>
+            <a:pPr algn="ctr"/>
+            <a:r>
+              <a:rPr lang="en-US" sz="1400" dirty="0"/>
+              <a:t>Sys Timer</a:t>
+            </a:r>
+          </a:p>
+        </p:txBody>
+      </p:sp>
+      <p:sp>
+        <p:nvSpPr>
+          <p:cNvPr id="54" name="Rectangle 53">
+            <a:extLst>
+              <a:ext uri="{FF2B5EF4-FFF2-40B4-BE49-F238E27FC236}">
+                <a16:creationId xmlns:a16="http://schemas.microsoft.com/office/drawing/2014/main" id="{53B802D9-F408-499A-8D35-85DCB967DFFB}"/>
+              </a:ext>
+            </a:extLst>
+          </p:cNvPr>
+          <p:cNvSpPr/>
+          <p:nvPr/>
+        </p:nvSpPr>
+        <p:spPr>
+          <a:xfrm>
+            <a:off x="2861618" y="3450149"/>
+            <a:ext cx="1438886" cy="1457767"/>
+          </a:xfrm>
+          <a:prstGeom prst="rect">
+            <a:avLst/>
+          </a:prstGeom>
+        </p:spPr>
+        <p:style>
+          <a:lnRef idx="2">
+            <a:schemeClr val="accent2">
+              <a:shade val="50000"/>
+            </a:schemeClr>
+          </a:lnRef>
+          <a:fillRef idx="1">
+            <a:schemeClr val="accent2"/>
+          </a:fillRef>
+          <a:effectRef idx="0">
+            <a:schemeClr val="accent2"/>
+          </a:effectRef>
+          <a:fontRef idx="minor">
+            <a:schemeClr val="lt1"/>
+          </a:fontRef>
+        </p:style>
+        <p:txBody>
+          <a:bodyPr rtlCol="0" anchor="t"/>
+          <a:lstStyle/>
+          <a:p>
+            <a:pPr algn="ctr"/>
+            <a:endParaRPr lang="en-US" sz="1400" dirty="0"/>
+          </a:p>
+        </p:txBody>
+      </p:sp>
+      <p:sp>
+        <p:nvSpPr>
+          <p:cNvPr id="56" name="Rectangle 55">
+            <a:extLst>
+              <a:ext uri="{FF2B5EF4-FFF2-40B4-BE49-F238E27FC236}">
+                <a16:creationId xmlns:a16="http://schemas.microsoft.com/office/drawing/2014/main" id="{F9248A19-33D6-4F34-90BA-A0183B026B0E}"/>
+              </a:ext>
+            </a:extLst>
+          </p:cNvPr>
+          <p:cNvSpPr/>
+          <p:nvPr/>
+        </p:nvSpPr>
+        <p:spPr>
+          <a:xfrm>
+            <a:off x="2924124" y="3517370"/>
+            <a:ext cx="1438886" cy="1457767"/>
+          </a:xfrm>
+          <a:prstGeom prst="rect">
+            <a:avLst/>
+          </a:prstGeom>
+        </p:spPr>
+        <p:style>
+          <a:lnRef idx="2">
+            <a:schemeClr val="accent2">
+              <a:shade val="50000"/>
+            </a:schemeClr>
+          </a:lnRef>
+          <a:fillRef idx="1">
+            <a:schemeClr val="accent2"/>
+          </a:fillRef>
+          <a:effectRef idx="0">
+            <a:schemeClr val="accent2"/>
+          </a:effectRef>
+          <a:fontRef idx="minor">
+            <a:schemeClr val="lt1"/>
+          </a:fontRef>
+        </p:style>
+        <p:txBody>
+          <a:bodyPr rtlCol="0" anchor="t"/>
+          <a:lstStyle/>
+          <a:p>
+            <a:pPr algn="ctr"/>
+            <a:endParaRPr lang="en-US" sz="1400" dirty="0"/>
+          </a:p>
+        </p:txBody>
+      </p:sp>
+      <p:sp>
+        <p:nvSpPr>
+          <p:cNvPr id="57" name="Rectangle 56">
+            <a:extLst>
+              <a:ext uri="{FF2B5EF4-FFF2-40B4-BE49-F238E27FC236}">
+                <a16:creationId xmlns:a16="http://schemas.microsoft.com/office/drawing/2014/main" id="{097C799C-049B-4397-84B4-637E5E2F4DE0}"/>
+              </a:ext>
+            </a:extLst>
+          </p:cNvPr>
+          <p:cNvSpPr/>
+          <p:nvPr/>
+        </p:nvSpPr>
+        <p:spPr>
+          <a:xfrm>
+            <a:off x="2982044" y="3602881"/>
+            <a:ext cx="1438886" cy="1457767"/>
+          </a:xfrm>
+          <a:prstGeom prst="rect">
+            <a:avLst/>
+          </a:prstGeom>
+        </p:spPr>
+        <p:style>
+          <a:lnRef idx="2">
+            <a:schemeClr val="accent2">
+              <a:shade val="50000"/>
+            </a:schemeClr>
+          </a:lnRef>
+          <a:fillRef idx="1">
+            <a:schemeClr val="accent2"/>
+          </a:fillRef>
+          <a:effectRef idx="0">
+            <a:schemeClr val="accent2"/>
+          </a:effectRef>
+          <a:fontRef idx="minor">
+            <a:schemeClr val="lt1"/>
+          </a:fontRef>
+        </p:style>
+        <p:txBody>
+          <a:bodyPr rtlCol="0" anchor="t"/>
+          <a:lstStyle/>
+          <a:p>
+            <a:pPr algn="ctr"/>
+            <a:endParaRPr lang="en-US" sz="1400" dirty="0"/>
+          </a:p>
+        </p:txBody>
+      </p:sp>
+      <p:sp>
+        <p:nvSpPr>
+          <p:cNvPr id="58" name="Rectangle 57">
+            <a:extLst>
+              <a:ext uri="{FF2B5EF4-FFF2-40B4-BE49-F238E27FC236}">
+                <a16:creationId xmlns:a16="http://schemas.microsoft.com/office/drawing/2014/main" id="{136F24C1-84A9-4C0F-A2FB-9FFFBDADEAE3}"/>
+              </a:ext>
+            </a:extLst>
+          </p:cNvPr>
+          <p:cNvSpPr/>
+          <p:nvPr/>
+        </p:nvSpPr>
+        <p:spPr>
+          <a:xfrm>
+            <a:off x="3033985" y="3679081"/>
+            <a:ext cx="1438886" cy="1457767"/>
+          </a:xfrm>
+          <a:prstGeom prst="rect">
+            <a:avLst/>
+          </a:prstGeom>
+        </p:spPr>
+        <p:style>
+          <a:lnRef idx="2">
+            <a:schemeClr val="accent2">
+              <a:shade val="50000"/>
+            </a:schemeClr>
+          </a:lnRef>
+          <a:fillRef idx="1">
+            <a:schemeClr val="accent2"/>
+          </a:fillRef>
+          <a:effectRef idx="0">
+            <a:schemeClr val="accent2"/>
+          </a:effectRef>
+          <a:fontRef idx="minor">
+            <a:schemeClr val="lt1"/>
+          </a:fontRef>
+        </p:style>
+        <p:txBody>
+          <a:bodyPr rtlCol="0" anchor="t"/>
+          <a:lstStyle/>
+          <a:p>
+            <a:pPr algn="ctr"/>
+            <a:endParaRPr lang="en-US" sz="1400" dirty="0"/>
+          </a:p>
+        </p:txBody>
+      </p:sp>
+      <p:sp>
+        <p:nvSpPr>
+          <p:cNvPr id="3" name="Rectangle 2">
+            <a:extLst>
+              <a:ext uri="{FF2B5EF4-FFF2-40B4-BE49-F238E27FC236}">
+                <a16:creationId xmlns:a16="http://schemas.microsoft.com/office/drawing/2014/main" id="{B4AAF730-F4DE-448E-920F-B5CA11BB7EB1}"/>
+              </a:ext>
+            </a:extLst>
+          </p:cNvPr>
+          <p:cNvSpPr/>
+          <p:nvPr/>
+        </p:nvSpPr>
+        <p:spPr>
+          <a:xfrm>
+            <a:off x="3084283" y="3755281"/>
+            <a:ext cx="1438886" cy="1707077"/>
+          </a:xfrm>
+          <a:prstGeom prst="rect">
+            <a:avLst/>
+          </a:prstGeom>
+        </p:spPr>
+        <p:style>
+          <a:lnRef idx="2">
+            <a:schemeClr val="accent2">
+              <a:shade val="50000"/>
+            </a:schemeClr>
+          </a:lnRef>
+          <a:fillRef idx="1">
+            <a:schemeClr val="accent2"/>
+          </a:fillRef>
+          <a:effectRef idx="0">
+            <a:schemeClr val="accent2"/>
+          </a:effectRef>
+          <a:fontRef idx="minor">
+            <a:schemeClr val="lt1"/>
+          </a:fontRef>
+        </p:style>
+        <p:txBody>
+          <a:bodyPr rtlCol="0" anchor="t"/>
+          <a:lstStyle/>
+          <a:p>
+            <a:pPr algn="ctr"/>
+            <a:r>
+              <a:rPr lang="en-US" sz="1200" dirty="0"/>
+              <a:t>External Sensor N</a:t>
+            </a:r>
+          </a:p>
+        </p:txBody>
+      </p:sp>
+      <p:sp>
+        <p:nvSpPr>
+          <p:cNvPr id="7" name="Rectangle 6">
+            <a:extLst>
+              <a:ext uri="{FF2B5EF4-FFF2-40B4-BE49-F238E27FC236}">
+                <a16:creationId xmlns:a16="http://schemas.microsoft.com/office/drawing/2014/main" id="{C6AC07AB-4FD6-4575-863A-82553BC4D6F2}"/>
+              </a:ext>
+            </a:extLst>
+          </p:cNvPr>
+          <p:cNvSpPr/>
+          <p:nvPr/>
+        </p:nvSpPr>
+        <p:spPr>
+          <a:xfrm>
+            <a:off x="3252348" y="4039870"/>
+            <a:ext cx="535417" cy="227160"/>
+          </a:xfrm>
+          <a:prstGeom prst="rect">
+            <a:avLst/>
+          </a:prstGeom>
+        </p:spPr>
+        <p:style>
+          <a:lnRef idx="2">
+            <a:schemeClr val="accent1">
+              <a:shade val="50000"/>
+            </a:schemeClr>
+          </a:lnRef>
+          <a:fillRef idx="1">
+            <a:schemeClr val="accent1"/>
+          </a:fillRef>
+          <a:effectRef idx="0">
+            <a:schemeClr val="accent1"/>
+          </a:effectRef>
+          <a:fontRef idx="minor">
+            <a:schemeClr val="lt1"/>
+          </a:fontRef>
+        </p:style>
+        <p:txBody>
+          <a:bodyPr rtlCol="0" anchor="t"/>
+          <a:lstStyle/>
+          <a:p>
+            <a:pPr algn="ctr"/>
+            <a:r>
+              <a:rPr lang="en-US" sz="1400" dirty="0"/>
+              <a:t>ID</a:t>
+            </a:r>
+          </a:p>
+        </p:txBody>
+      </p:sp>
+      <p:sp>
+        <p:nvSpPr>
+          <p:cNvPr id="45" name="Rectangle 44">
+            <a:extLst>
+              <a:ext uri="{FF2B5EF4-FFF2-40B4-BE49-F238E27FC236}">
+                <a16:creationId xmlns:a16="http://schemas.microsoft.com/office/drawing/2014/main" id="{31B21920-5D34-4BAC-9A50-81B173D0C735}"/>
+              </a:ext>
+            </a:extLst>
+          </p:cNvPr>
+          <p:cNvSpPr/>
+          <p:nvPr/>
+        </p:nvSpPr>
+        <p:spPr>
+          <a:xfrm>
+            <a:off x="3252347" y="4315721"/>
+            <a:ext cx="1223031" cy="292363"/>
+          </a:xfrm>
+          <a:prstGeom prst="rect">
+            <a:avLst/>
+          </a:prstGeom>
+        </p:spPr>
+        <p:style>
+          <a:lnRef idx="2">
+            <a:schemeClr val="accent1">
+              <a:shade val="50000"/>
+            </a:schemeClr>
+          </a:lnRef>
+          <a:fillRef idx="1">
+            <a:schemeClr val="accent1"/>
+          </a:fillRef>
+          <a:effectRef idx="0">
+            <a:schemeClr val="accent1"/>
+          </a:effectRef>
+          <a:fontRef idx="minor">
+            <a:schemeClr val="lt1"/>
+          </a:fontRef>
+        </p:style>
+        <p:txBody>
+          <a:bodyPr rtlCol="0" anchor="t"/>
+          <a:lstStyle/>
+          <a:p>
+            <a:pPr algn="ctr"/>
+            <a:r>
+              <a:rPr lang="en-US" sz="1400" dirty="0"/>
+              <a:t>Sample Period</a:t>
+            </a:r>
+          </a:p>
+        </p:txBody>
+      </p:sp>
+      <p:sp>
+        <p:nvSpPr>
+          <p:cNvPr id="52" name="Rectangle 51">
+            <a:extLst>
+              <a:ext uri="{FF2B5EF4-FFF2-40B4-BE49-F238E27FC236}">
+                <a16:creationId xmlns:a16="http://schemas.microsoft.com/office/drawing/2014/main" id="{6CC66ACD-03DC-4951-B1A9-331227B27555}"/>
+              </a:ext>
+            </a:extLst>
+          </p:cNvPr>
+          <p:cNvSpPr/>
+          <p:nvPr/>
+        </p:nvSpPr>
+        <p:spPr>
+          <a:xfrm>
+            <a:off x="3252347" y="4644282"/>
+            <a:ext cx="1223031" cy="468427"/>
+          </a:xfrm>
+          <a:prstGeom prst="rect">
+            <a:avLst/>
+          </a:prstGeom>
+        </p:spPr>
+        <p:style>
+          <a:lnRef idx="2">
+            <a:schemeClr val="accent1">
+              <a:shade val="50000"/>
+            </a:schemeClr>
+          </a:lnRef>
+          <a:fillRef idx="1">
+            <a:schemeClr val="accent1"/>
+          </a:fillRef>
+          <a:effectRef idx="0">
+            <a:schemeClr val="accent1"/>
+          </a:effectRef>
+          <a:fontRef idx="minor">
+            <a:schemeClr val="lt1"/>
+          </a:fontRef>
+        </p:style>
+        <p:txBody>
+          <a:bodyPr rtlCol="0" anchor="t"/>
+          <a:lstStyle/>
+          <a:p>
+            <a:pPr algn="ctr"/>
+            <a:r>
+              <a:rPr lang="en-US" sz="1400" dirty="0"/>
+              <a:t>Last Sample Sys Time</a:t>
+            </a:r>
+          </a:p>
+        </p:txBody>
+      </p:sp>
+      <p:sp>
+        <p:nvSpPr>
+          <p:cNvPr id="59" name="Rectangle 58">
+            <a:extLst>
+              <a:ext uri="{FF2B5EF4-FFF2-40B4-BE49-F238E27FC236}">
+                <a16:creationId xmlns:a16="http://schemas.microsoft.com/office/drawing/2014/main" id="{A41EF06A-7955-480D-A2D8-05A18E453F4B}"/>
+              </a:ext>
+            </a:extLst>
+          </p:cNvPr>
+          <p:cNvSpPr/>
+          <p:nvPr/>
+        </p:nvSpPr>
+        <p:spPr>
+          <a:xfrm>
+            <a:off x="405532" y="3510363"/>
+            <a:ext cx="1438886" cy="1457767"/>
+          </a:xfrm>
+          <a:prstGeom prst="rect">
+            <a:avLst/>
+          </a:prstGeom>
+        </p:spPr>
+        <p:style>
+          <a:lnRef idx="2">
+            <a:schemeClr val="accent2">
+              <a:shade val="50000"/>
+            </a:schemeClr>
+          </a:lnRef>
+          <a:fillRef idx="1">
+            <a:schemeClr val="accent2"/>
+          </a:fillRef>
+          <a:effectRef idx="0">
+            <a:schemeClr val="accent2"/>
+          </a:effectRef>
+          <a:fontRef idx="minor">
+            <a:schemeClr val="lt1"/>
+          </a:fontRef>
+        </p:style>
+        <p:txBody>
+          <a:bodyPr rtlCol="0" anchor="t"/>
+          <a:lstStyle/>
+          <a:p>
+            <a:pPr algn="ctr"/>
+            <a:endParaRPr lang="en-US" sz="1400" dirty="0"/>
+          </a:p>
+        </p:txBody>
+      </p:sp>
+      <p:sp>
+        <p:nvSpPr>
+          <p:cNvPr id="60" name="Rectangle 59">
+            <a:extLst>
+              <a:ext uri="{FF2B5EF4-FFF2-40B4-BE49-F238E27FC236}">
+                <a16:creationId xmlns:a16="http://schemas.microsoft.com/office/drawing/2014/main" id="{9FBE5BDE-A9B0-4297-BC30-20E41725A1CC}"/>
+              </a:ext>
+            </a:extLst>
+          </p:cNvPr>
+          <p:cNvSpPr/>
+          <p:nvPr/>
+        </p:nvSpPr>
+        <p:spPr>
+          <a:xfrm>
+            <a:off x="468038" y="3577584"/>
+            <a:ext cx="1438886" cy="1457767"/>
+          </a:xfrm>
+          <a:prstGeom prst="rect">
+            <a:avLst/>
+          </a:prstGeom>
+        </p:spPr>
+        <p:style>
+          <a:lnRef idx="2">
+            <a:schemeClr val="accent2">
+              <a:shade val="50000"/>
+            </a:schemeClr>
+          </a:lnRef>
+          <a:fillRef idx="1">
+            <a:schemeClr val="accent2"/>
+          </a:fillRef>
+          <a:effectRef idx="0">
+            <a:schemeClr val="accent2"/>
+          </a:effectRef>
+          <a:fontRef idx="minor">
+            <a:schemeClr val="lt1"/>
+          </a:fontRef>
+        </p:style>
+        <p:txBody>
+          <a:bodyPr rtlCol="0" anchor="t"/>
+          <a:lstStyle/>
+          <a:p>
+            <a:pPr algn="ctr"/>
+            <a:endParaRPr lang="en-US" sz="1400" dirty="0"/>
+          </a:p>
+        </p:txBody>
+      </p:sp>
+      <p:sp>
+        <p:nvSpPr>
+          <p:cNvPr id="61" name="Rectangle 60">
+            <a:extLst>
+              <a:ext uri="{FF2B5EF4-FFF2-40B4-BE49-F238E27FC236}">
+                <a16:creationId xmlns:a16="http://schemas.microsoft.com/office/drawing/2014/main" id="{57E74C97-1CFF-4FF1-AB65-E8FB3F020510}"/>
+              </a:ext>
+            </a:extLst>
+          </p:cNvPr>
+          <p:cNvSpPr/>
+          <p:nvPr/>
+        </p:nvSpPr>
+        <p:spPr>
+          <a:xfrm>
+            <a:off x="525958" y="3663095"/>
+            <a:ext cx="1438886" cy="1457767"/>
+          </a:xfrm>
+          <a:prstGeom prst="rect">
+            <a:avLst/>
+          </a:prstGeom>
+        </p:spPr>
+        <p:style>
+          <a:lnRef idx="2">
+            <a:schemeClr val="accent2">
+              <a:shade val="50000"/>
+            </a:schemeClr>
+          </a:lnRef>
+          <a:fillRef idx="1">
+            <a:schemeClr val="accent2"/>
+          </a:fillRef>
+          <a:effectRef idx="0">
+            <a:schemeClr val="accent2"/>
+          </a:effectRef>
+          <a:fontRef idx="minor">
+            <a:schemeClr val="lt1"/>
+          </a:fontRef>
+        </p:style>
+        <p:txBody>
+          <a:bodyPr rtlCol="0" anchor="t"/>
+          <a:lstStyle/>
+          <a:p>
+            <a:pPr algn="ctr"/>
+            <a:endParaRPr lang="en-US" sz="1400" dirty="0"/>
+          </a:p>
+        </p:txBody>
+      </p:sp>
+      <p:sp>
+        <p:nvSpPr>
+          <p:cNvPr id="62" name="Rectangle 61">
+            <a:extLst>
+              <a:ext uri="{FF2B5EF4-FFF2-40B4-BE49-F238E27FC236}">
+                <a16:creationId xmlns:a16="http://schemas.microsoft.com/office/drawing/2014/main" id="{BA801362-0B1C-4AF5-A86B-E02C53C5EACA}"/>
+              </a:ext>
+            </a:extLst>
+          </p:cNvPr>
+          <p:cNvSpPr/>
+          <p:nvPr/>
+        </p:nvSpPr>
+        <p:spPr>
+          <a:xfrm>
+            <a:off x="577899" y="3739295"/>
+            <a:ext cx="1438886" cy="1457767"/>
+          </a:xfrm>
+          <a:prstGeom prst="rect">
+            <a:avLst/>
+          </a:prstGeom>
+        </p:spPr>
+        <p:style>
+          <a:lnRef idx="2">
+            <a:schemeClr val="accent2">
+              <a:shade val="50000"/>
+            </a:schemeClr>
+          </a:lnRef>
+          <a:fillRef idx="1">
+            <a:schemeClr val="accent2"/>
+          </a:fillRef>
+          <a:effectRef idx="0">
+            <a:schemeClr val="accent2"/>
+          </a:effectRef>
+          <a:fontRef idx="minor">
+            <a:schemeClr val="lt1"/>
+          </a:fontRef>
+        </p:style>
+        <p:txBody>
+          <a:bodyPr rtlCol="0" anchor="t"/>
+          <a:lstStyle/>
+          <a:p>
+            <a:pPr algn="ctr"/>
+            <a:endParaRPr lang="en-US" sz="1400" dirty="0"/>
+          </a:p>
+        </p:txBody>
+      </p:sp>
+      <p:sp>
+        <p:nvSpPr>
+          <p:cNvPr id="63" name="Rectangle 62">
+            <a:extLst>
+              <a:ext uri="{FF2B5EF4-FFF2-40B4-BE49-F238E27FC236}">
+                <a16:creationId xmlns:a16="http://schemas.microsoft.com/office/drawing/2014/main" id="{AFC4FA20-0DB8-4DEA-BBB5-37C508574AC2}"/>
+              </a:ext>
+            </a:extLst>
+          </p:cNvPr>
+          <p:cNvSpPr/>
+          <p:nvPr/>
+        </p:nvSpPr>
+        <p:spPr>
+          <a:xfrm>
+            <a:off x="628197" y="3815495"/>
+            <a:ext cx="1438886" cy="1698836"/>
+          </a:xfrm>
+          <a:prstGeom prst="rect">
+            <a:avLst/>
+          </a:prstGeom>
+        </p:spPr>
+        <p:style>
+          <a:lnRef idx="2">
+            <a:schemeClr val="accent2">
+              <a:shade val="50000"/>
+            </a:schemeClr>
+          </a:lnRef>
+          <a:fillRef idx="1">
+            <a:schemeClr val="accent2"/>
+          </a:fillRef>
+          <a:effectRef idx="0">
+            <a:schemeClr val="accent2"/>
+          </a:effectRef>
+          <a:fontRef idx="minor">
+            <a:schemeClr val="lt1"/>
+          </a:fontRef>
+        </p:style>
+        <p:txBody>
+          <a:bodyPr rtlCol="0" anchor="t"/>
+          <a:lstStyle/>
+          <a:p>
+            <a:pPr algn="ctr"/>
+            <a:r>
+              <a:rPr lang="en-US" sz="1400" dirty="0"/>
+              <a:t>Internal Sensor N</a:t>
+            </a:r>
+          </a:p>
+        </p:txBody>
+      </p:sp>
+      <p:sp>
+        <p:nvSpPr>
+          <p:cNvPr id="64" name="Rectangle 63">
+            <a:extLst>
+              <a:ext uri="{FF2B5EF4-FFF2-40B4-BE49-F238E27FC236}">
+                <a16:creationId xmlns:a16="http://schemas.microsoft.com/office/drawing/2014/main" id="{F68C3624-D4E1-4449-A8F1-99C10E647738}"/>
+              </a:ext>
+            </a:extLst>
+          </p:cNvPr>
+          <p:cNvSpPr/>
+          <p:nvPr/>
+        </p:nvSpPr>
+        <p:spPr>
+          <a:xfrm>
+            <a:off x="796262" y="4100084"/>
+            <a:ext cx="535417" cy="227160"/>
+          </a:xfrm>
+          <a:prstGeom prst="rect">
+            <a:avLst/>
+          </a:prstGeom>
+        </p:spPr>
+        <p:style>
+          <a:lnRef idx="2">
+            <a:schemeClr val="accent1">
+              <a:shade val="50000"/>
+            </a:schemeClr>
+          </a:lnRef>
+          <a:fillRef idx="1">
+            <a:schemeClr val="accent1"/>
+          </a:fillRef>
+          <a:effectRef idx="0">
+            <a:schemeClr val="accent1"/>
+          </a:effectRef>
+          <a:fontRef idx="minor">
+            <a:schemeClr val="lt1"/>
+          </a:fontRef>
+        </p:style>
+        <p:txBody>
+          <a:bodyPr rtlCol="0" anchor="t"/>
+          <a:lstStyle/>
+          <a:p>
+            <a:pPr algn="ctr"/>
+            <a:r>
+              <a:rPr lang="en-US" sz="1400" dirty="0"/>
+              <a:t>ID</a:t>
+            </a:r>
+          </a:p>
+        </p:txBody>
+      </p:sp>
+      <p:sp>
+        <p:nvSpPr>
+          <p:cNvPr id="65" name="Rectangle 64">
+            <a:extLst>
+              <a:ext uri="{FF2B5EF4-FFF2-40B4-BE49-F238E27FC236}">
+                <a16:creationId xmlns:a16="http://schemas.microsoft.com/office/drawing/2014/main" id="{13257F17-6C63-49C6-B1B3-47DA18305C5F}"/>
+              </a:ext>
+            </a:extLst>
+          </p:cNvPr>
+          <p:cNvSpPr/>
+          <p:nvPr/>
+        </p:nvSpPr>
+        <p:spPr>
+          <a:xfrm>
+            <a:off x="796261" y="4375935"/>
+            <a:ext cx="1223031" cy="292363"/>
+          </a:xfrm>
+          <a:prstGeom prst="rect">
+            <a:avLst/>
+          </a:prstGeom>
+        </p:spPr>
+        <p:style>
+          <a:lnRef idx="2">
+            <a:schemeClr val="accent1">
+              <a:shade val="50000"/>
+            </a:schemeClr>
+          </a:lnRef>
+          <a:fillRef idx="1">
+            <a:schemeClr val="accent1"/>
+          </a:fillRef>
+          <a:effectRef idx="0">
+            <a:schemeClr val="accent1"/>
+          </a:effectRef>
+          <a:fontRef idx="minor">
+            <a:schemeClr val="lt1"/>
+          </a:fontRef>
+        </p:style>
+        <p:txBody>
+          <a:bodyPr rtlCol="0" anchor="t"/>
+          <a:lstStyle/>
+          <a:p>
+            <a:pPr algn="ctr"/>
+            <a:r>
+              <a:rPr lang="en-US" sz="1400" dirty="0"/>
+              <a:t>Sample Period</a:t>
+            </a:r>
+          </a:p>
+        </p:txBody>
+      </p:sp>
+      <p:sp>
+        <p:nvSpPr>
+          <p:cNvPr id="66" name="Rectangle 65">
+            <a:extLst>
+              <a:ext uri="{FF2B5EF4-FFF2-40B4-BE49-F238E27FC236}">
+                <a16:creationId xmlns:a16="http://schemas.microsoft.com/office/drawing/2014/main" id="{0FE17119-E667-4B13-B454-3D8FA34EC8C1}"/>
+              </a:ext>
+            </a:extLst>
+          </p:cNvPr>
+          <p:cNvSpPr/>
+          <p:nvPr/>
+        </p:nvSpPr>
+        <p:spPr>
+          <a:xfrm>
+            <a:off x="796261" y="4704496"/>
+            <a:ext cx="1223031" cy="468427"/>
+          </a:xfrm>
+          <a:prstGeom prst="rect">
+            <a:avLst/>
+          </a:prstGeom>
+        </p:spPr>
+        <p:style>
+          <a:lnRef idx="2">
+            <a:schemeClr val="accent1">
+              <a:shade val="50000"/>
+            </a:schemeClr>
+          </a:lnRef>
+          <a:fillRef idx="1">
+            <a:schemeClr val="accent1"/>
+          </a:fillRef>
+          <a:effectRef idx="0">
+            <a:schemeClr val="accent1"/>
+          </a:effectRef>
+          <a:fontRef idx="minor">
+            <a:schemeClr val="lt1"/>
+          </a:fontRef>
+        </p:style>
+        <p:txBody>
+          <a:bodyPr rtlCol="0" anchor="t"/>
+          <a:lstStyle/>
+          <a:p>
+            <a:pPr algn="ctr"/>
+            <a:r>
+              <a:rPr lang="en-US" sz="1400" dirty="0"/>
+              <a:t>Last Sample Sys Time</a:t>
+            </a:r>
+          </a:p>
+        </p:txBody>
+      </p:sp>
       <p:cxnSp>
         <p:nvCxnSpPr>
-          <p:cNvPr id="100" name="Straight Arrow Connector 99">
-            <a:extLst>
-              <a:ext uri="{FF2B5EF4-FFF2-40B4-BE49-F238E27FC236}">
-                <a16:creationId xmlns:a16="http://schemas.microsoft.com/office/drawing/2014/main" id="{6088002B-A8FC-457B-BC71-841F44B6A752}"/>
+          <p:cNvPr id="22" name="Connector: Elbow 21">
+            <a:extLst>
+              <a:ext uri="{FF2B5EF4-FFF2-40B4-BE49-F238E27FC236}">
+                <a16:creationId xmlns:a16="http://schemas.microsoft.com/office/drawing/2014/main" id="{F3F8D29C-B11B-4B8E-8102-6E9D54D98946}"/>
               </a:ext>
             </a:extLst>
           </p:cNvPr>
           <p:cNvCxnSpPr>
-            <a:stCxn id="88" idx="2"/>
+            <a:stCxn id="2" idx="1"/>
+            <a:endCxn id="52" idx="3"/>
           </p:cNvCxnSpPr>
           <p:nvPr/>
         </p:nvCxnSpPr>
         <p:spPr>
-          <a:xfrm>
-            <a:off x="11193415" y="4543253"/>
-            <a:ext cx="7985" cy="1365178"/>
-          </a:xfrm>
-          <a:prstGeom prst="straightConnector1">
-            <a:avLst/>
+          <a:xfrm rot="10800000" flipV="1">
+            <a:off x="4475378" y="4365688"/>
+            <a:ext cx="483354" cy="512807"/>
+          </a:xfrm>
+          <a:prstGeom prst="bentConnector3">
+            <a:avLst>
+              <a:gd name="adj1" fmla="val 50000"/>
+            </a:avLst>
           </a:prstGeom>
           <a:ln>
             <a:tailEnd type="triangle"/>
@@ -5199,10 +5893,944 @@
       </p:cxnSp>
       <p:sp>
         <p:nvSpPr>
-          <p:cNvPr id="101" name="TextBox 100">
-            <a:extLst>
-              <a:ext uri="{FF2B5EF4-FFF2-40B4-BE49-F238E27FC236}">
-                <a16:creationId xmlns:a16="http://schemas.microsoft.com/office/drawing/2014/main" id="{DA0B43C5-2794-429F-B0D7-8756385A445A}"/>
+          <p:cNvPr id="29" name="Rectangle 28">
+            <a:extLst>
+              <a:ext uri="{FF2B5EF4-FFF2-40B4-BE49-F238E27FC236}">
+                <a16:creationId xmlns:a16="http://schemas.microsoft.com/office/drawing/2014/main" id="{4B28FEE0-6E4E-4D54-A90F-F40CA312F38A}"/>
+              </a:ext>
+            </a:extLst>
+          </p:cNvPr>
+          <p:cNvSpPr/>
+          <p:nvPr/>
+        </p:nvSpPr>
+        <p:spPr>
+          <a:xfrm>
+            <a:off x="3252347" y="5170197"/>
+            <a:ext cx="1227072" cy="233838"/>
+          </a:xfrm>
+          <a:prstGeom prst="rect">
+            <a:avLst/>
+          </a:prstGeom>
+        </p:spPr>
+        <p:style>
+          <a:lnRef idx="2">
+            <a:schemeClr val="accent1">
+              <a:shade val="50000"/>
+            </a:schemeClr>
+          </a:lnRef>
+          <a:fillRef idx="1">
+            <a:schemeClr val="accent1"/>
+          </a:fillRef>
+          <a:effectRef idx="0">
+            <a:schemeClr val="accent1"/>
+          </a:effectRef>
+          <a:fontRef idx="minor">
+            <a:schemeClr val="lt1"/>
+          </a:fontRef>
+        </p:style>
+        <p:txBody>
+          <a:bodyPr rtlCol="0" anchor="t"/>
+          <a:lstStyle/>
+          <a:p>
+            <a:pPr algn="ctr"/>
+            <a:r>
+              <a:rPr lang="en-US" sz="1400" dirty="0"/>
+              <a:t>DATA</a:t>
+            </a:r>
+          </a:p>
+        </p:txBody>
+      </p:sp>
+      <p:sp>
+        <p:nvSpPr>
+          <p:cNvPr id="71" name="Rectangle 70">
+            <a:extLst>
+              <a:ext uri="{FF2B5EF4-FFF2-40B4-BE49-F238E27FC236}">
+                <a16:creationId xmlns:a16="http://schemas.microsoft.com/office/drawing/2014/main" id="{5BE4955E-51EB-4E88-8F3A-67D6EEBF4EC2}"/>
+              </a:ext>
+            </a:extLst>
+          </p:cNvPr>
+          <p:cNvSpPr/>
+          <p:nvPr/>
+        </p:nvSpPr>
+        <p:spPr>
+          <a:xfrm>
+            <a:off x="805682" y="5212544"/>
+            <a:ext cx="1227072" cy="233838"/>
+          </a:xfrm>
+          <a:prstGeom prst="rect">
+            <a:avLst/>
+          </a:prstGeom>
+        </p:spPr>
+        <p:style>
+          <a:lnRef idx="2">
+            <a:schemeClr val="accent1">
+              <a:shade val="50000"/>
+            </a:schemeClr>
+          </a:lnRef>
+          <a:fillRef idx="1">
+            <a:schemeClr val="accent1"/>
+          </a:fillRef>
+          <a:effectRef idx="0">
+            <a:schemeClr val="accent1"/>
+          </a:effectRef>
+          <a:fontRef idx="minor">
+            <a:schemeClr val="lt1"/>
+          </a:fontRef>
+        </p:style>
+        <p:txBody>
+          <a:bodyPr rtlCol="0" anchor="t"/>
+          <a:lstStyle/>
+          <a:p>
+            <a:pPr algn="ctr"/>
+            <a:r>
+              <a:rPr lang="en-US" sz="1400" dirty="0"/>
+              <a:t>DATA</a:t>
+            </a:r>
+          </a:p>
+        </p:txBody>
+      </p:sp>
+      <p:sp>
+        <p:nvSpPr>
+          <p:cNvPr id="33" name="Rectangle 32">
+            <a:extLst>
+              <a:ext uri="{FF2B5EF4-FFF2-40B4-BE49-F238E27FC236}">
+                <a16:creationId xmlns:a16="http://schemas.microsoft.com/office/drawing/2014/main" id="{ACA0B2A3-D1A7-42C6-BD16-64B7BF083E40}"/>
+              </a:ext>
+            </a:extLst>
+          </p:cNvPr>
+          <p:cNvSpPr/>
+          <p:nvPr/>
+        </p:nvSpPr>
+        <p:spPr>
+          <a:xfrm>
+            <a:off x="4960697" y="2971613"/>
+            <a:ext cx="410077" cy="156357"/>
+          </a:xfrm>
+          <a:prstGeom prst="rect">
+            <a:avLst/>
+          </a:prstGeom>
+        </p:spPr>
+        <p:style>
+          <a:lnRef idx="3">
+            <a:schemeClr val="lt1"/>
+          </a:lnRef>
+          <a:fillRef idx="1">
+            <a:schemeClr val="accent1"/>
+          </a:fillRef>
+          <a:effectRef idx="1">
+            <a:schemeClr val="accent1"/>
+          </a:effectRef>
+          <a:fontRef idx="minor">
+            <a:schemeClr val="lt1"/>
+          </a:fontRef>
+        </p:style>
+        <p:txBody>
+          <a:bodyPr rtlCol="0" anchor="t"/>
+          <a:lstStyle/>
+          <a:p>
+            <a:pPr algn="ctr"/>
+            <a:r>
+              <a:rPr lang="en-US" sz="800" dirty="0"/>
+              <a:t>ID</a:t>
+            </a:r>
+          </a:p>
+        </p:txBody>
+      </p:sp>
+      <p:sp>
+        <p:nvSpPr>
+          <p:cNvPr id="73" name="Rectangle 72">
+            <a:extLst>
+              <a:ext uri="{FF2B5EF4-FFF2-40B4-BE49-F238E27FC236}">
+                <a16:creationId xmlns:a16="http://schemas.microsoft.com/office/drawing/2014/main" id="{CDF51F51-2C42-4BCC-9382-B01F9DED130F}"/>
+              </a:ext>
+            </a:extLst>
+          </p:cNvPr>
+          <p:cNvSpPr/>
+          <p:nvPr/>
+        </p:nvSpPr>
+        <p:spPr>
+          <a:xfrm>
+            <a:off x="5366179" y="2971613"/>
+            <a:ext cx="652286" cy="156357"/>
+          </a:xfrm>
+          <a:prstGeom prst="rect">
+            <a:avLst/>
+          </a:prstGeom>
+        </p:spPr>
+        <p:style>
+          <a:lnRef idx="3">
+            <a:schemeClr val="lt1"/>
+          </a:lnRef>
+          <a:fillRef idx="1">
+            <a:schemeClr val="accent1"/>
+          </a:fillRef>
+          <a:effectRef idx="1">
+            <a:schemeClr val="accent1"/>
+          </a:effectRef>
+          <a:fontRef idx="minor">
+            <a:schemeClr val="lt1"/>
+          </a:fontRef>
+        </p:style>
+        <p:txBody>
+          <a:bodyPr rtlCol="0" anchor="t"/>
+          <a:lstStyle/>
+          <a:p>
+            <a:pPr algn="ctr"/>
+            <a:r>
+              <a:rPr lang="en-US" sz="800" dirty="0"/>
+              <a:t>Data</a:t>
+            </a:r>
+          </a:p>
+        </p:txBody>
+      </p:sp>
+      <p:sp>
+        <p:nvSpPr>
+          <p:cNvPr id="74" name="Rectangle 73">
+            <a:extLst>
+              <a:ext uri="{FF2B5EF4-FFF2-40B4-BE49-F238E27FC236}">
+                <a16:creationId xmlns:a16="http://schemas.microsoft.com/office/drawing/2014/main" id="{CA9F81B1-601A-49F0-8859-E13563C68C50}"/>
+              </a:ext>
+            </a:extLst>
+          </p:cNvPr>
+          <p:cNvSpPr/>
+          <p:nvPr/>
+        </p:nvSpPr>
+        <p:spPr>
+          <a:xfrm>
+            <a:off x="4969473" y="3126513"/>
+            <a:ext cx="410077" cy="156357"/>
+          </a:xfrm>
+          <a:prstGeom prst="rect">
+            <a:avLst/>
+          </a:prstGeom>
+        </p:spPr>
+        <p:style>
+          <a:lnRef idx="3">
+            <a:schemeClr val="lt1"/>
+          </a:lnRef>
+          <a:fillRef idx="1">
+            <a:schemeClr val="accent1"/>
+          </a:fillRef>
+          <a:effectRef idx="1">
+            <a:schemeClr val="accent1"/>
+          </a:effectRef>
+          <a:fontRef idx="minor">
+            <a:schemeClr val="lt1"/>
+          </a:fontRef>
+        </p:style>
+        <p:txBody>
+          <a:bodyPr rtlCol="0" anchor="t"/>
+          <a:lstStyle/>
+          <a:p>
+            <a:pPr algn="ctr"/>
+            <a:r>
+              <a:rPr lang="en-US" sz="800" dirty="0"/>
+              <a:t>ID</a:t>
+            </a:r>
+          </a:p>
+        </p:txBody>
+      </p:sp>
+      <p:sp>
+        <p:nvSpPr>
+          <p:cNvPr id="75" name="Rectangle 74">
+            <a:extLst>
+              <a:ext uri="{FF2B5EF4-FFF2-40B4-BE49-F238E27FC236}">
+                <a16:creationId xmlns:a16="http://schemas.microsoft.com/office/drawing/2014/main" id="{4FA75244-0AAA-476A-9DE4-6686797D1DE9}"/>
+              </a:ext>
+            </a:extLst>
+          </p:cNvPr>
+          <p:cNvSpPr/>
+          <p:nvPr/>
+        </p:nvSpPr>
+        <p:spPr>
+          <a:xfrm>
+            <a:off x="5374955" y="3126513"/>
+            <a:ext cx="652286" cy="156357"/>
+          </a:xfrm>
+          <a:prstGeom prst="rect">
+            <a:avLst/>
+          </a:prstGeom>
+        </p:spPr>
+        <p:style>
+          <a:lnRef idx="3">
+            <a:schemeClr val="lt1"/>
+          </a:lnRef>
+          <a:fillRef idx="1">
+            <a:schemeClr val="accent1"/>
+          </a:fillRef>
+          <a:effectRef idx="1">
+            <a:schemeClr val="accent1"/>
+          </a:effectRef>
+          <a:fontRef idx="minor">
+            <a:schemeClr val="lt1"/>
+          </a:fontRef>
+        </p:style>
+        <p:txBody>
+          <a:bodyPr rtlCol="0" anchor="t"/>
+          <a:lstStyle/>
+          <a:p>
+            <a:pPr algn="ctr"/>
+            <a:r>
+              <a:rPr lang="en-US" sz="800" dirty="0"/>
+              <a:t>Data</a:t>
+            </a:r>
+          </a:p>
+        </p:txBody>
+      </p:sp>
+      <p:sp>
+        <p:nvSpPr>
+          <p:cNvPr id="80" name="Rectangle 79">
+            <a:extLst>
+              <a:ext uri="{FF2B5EF4-FFF2-40B4-BE49-F238E27FC236}">
+                <a16:creationId xmlns:a16="http://schemas.microsoft.com/office/drawing/2014/main" id="{D9376AD5-568F-445C-BE63-007381811F86}"/>
+              </a:ext>
+            </a:extLst>
+          </p:cNvPr>
+          <p:cNvSpPr/>
+          <p:nvPr/>
+        </p:nvSpPr>
+        <p:spPr>
+          <a:xfrm>
+            <a:off x="4969473" y="3281256"/>
+            <a:ext cx="410077" cy="156357"/>
+          </a:xfrm>
+          <a:prstGeom prst="rect">
+            <a:avLst/>
+          </a:prstGeom>
+        </p:spPr>
+        <p:style>
+          <a:lnRef idx="3">
+            <a:schemeClr val="lt1"/>
+          </a:lnRef>
+          <a:fillRef idx="1">
+            <a:schemeClr val="accent1"/>
+          </a:fillRef>
+          <a:effectRef idx="1">
+            <a:schemeClr val="accent1"/>
+          </a:effectRef>
+          <a:fontRef idx="minor">
+            <a:schemeClr val="lt1"/>
+          </a:fontRef>
+        </p:style>
+        <p:txBody>
+          <a:bodyPr rtlCol="0" anchor="t"/>
+          <a:lstStyle/>
+          <a:p>
+            <a:pPr algn="ctr"/>
+            <a:r>
+              <a:rPr lang="en-US" sz="800" dirty="0"/>
+              <a:t>ID</a:t>
+            </a:r>
+          </a:p>
+        </p:txBody>
+      </p:sp>
+      <p:sp>
+        <p:nvSpPr>
+          <p:cNvPr id="89" name="Rectangle 88">
+            <a:extLst>
+              <a:ext uri="{FF2B5EF4-FFF2-40B4-BE49-F238E27FC236}">
+                <a16:creationId xmlns:a16="http://schemas.microsoft.com/office/drawing/2014/main" id="{577BB479-57C2-4E33-B0A9-ABE6BF69F752}"/>
+              </a:ext>
+            </a:extLst>
+          </p:cNvPr>
+          <p:cNvSpPr/>
+          <p:nvPr/>
+        </p:nvSpPr>
+        <p:spPr>
+          <a:xfrm>
+            <a:off x="5374955" y="3281256"/>
+            <a:ext cx="652286" cy="156357"/>
+          </a:xfrm>
+          <a:prstGeom prst="rect">
+            <a:avLst/>
+          </a:prstGeom>
+        </p:spPr>
+        <p:style>
+          <a:lnRef idx="3">
+            <a:schemeClr val="lt1"/>
+          </a:lnRef>
+          <a:fillRef idx="1">
+            <a:schemeClr val="accent1"/>
+          </a:fillRef>
+          <a:effectRef idx="1">
+            <a:schemeClr val="accent1"/>
+          </a:effectRef>
+          <a:fontRef idx="minor">
+            <a:schemeClr val="lt1"/>
+          </a:fontRef>
+        </p:style>
+        <p:txBody>
+          <a:bodyPr rtlCol="0" anchor="t"/>
+          <a:lstStyle/>
+          <a:p>
+            <a:pPr algn="ctr"/>
+            <a:r>
+              <a:rPr lang="en-US" sz="800" dirty="0"/>
+              <a:t>Data</a:t>
+            </a:r>
+          </a:p>
+        </p:txBody>
+      </p:sp>
+      <p:sp>
+        <p:nvSpPr>
+          <p:cNvPr id="90" name="Rectangle 89">
+            <a:extLst>
+              <a:ext uri="{FF2B5EF4-FFF2-40B4-BE49-F238E27FC236}">
+                <a16:creationId xmlns:a16="http://schemas.microsoft.com/office/drawing/2014/main" id="{A31AA75A-A106-4190-AF59-672D4E542CC9}"/>
+              </a:ext>
+            </a:extLst>
+          </p:cNvPr>
+          <p:cNvSpPr/>
+          <p:nvPr/>
+        </p:nvSpPr>
+        <p:spPr>
+          <a:xfrm>
+            <a:off x="4969074" y="3439191"/>
+            <a:ext cx="410077" cy="156357"/>
+          </a:xfrm>
+          <a:prstGeom prst="rect">
+            <a:avLst/>
+          </a:prstGeom>
+        </p:spPr>
+        <p:style>
+          <a:lnRef idx="3">
+            <a:schemeClr val="lt1"/>
+          </a:lnRef>
+          <a:fillRef idx="1">
+            <a:schemeClr val="accent1"/>
+          </a:fillRef>
+          <a:effectRef idx="1">
+            <a:schemeClr val="accent1"/>
+          </a:effectRef>
+          <a:fontRef idx="minor">
+            <a:schemeClr val="lt1"/>
+          </a:fontRef>
+        </p:style>
+        <p:txBody>
+          <a:bodyPr rtlCol="0" anchor="t"/>
+          <a:lstStyle/>
+          <a:p>
+            <a:pPr algn="ctr"/>
+            <a:r>
+              <a:rPr lang="en-US" sz="800" dirty="0"/>
+              <a:t>ID</a:t>
+            </a:r>
+          </a:p>
+        </p:txBody>
+      </p:sp>
+      <p:sp>
+        <p:nvSpPr>
+          <p:cNvPr id="91" name="Rectangle 90">
+            <a:extLst>
+              <a:ext uri="{FF2B5EF4-FFF2-40B4-BE49-F238E27FC236}">
+                <a16:creationId xmlns:a16="http://schemas.microsoft.com/office/drawing/2014/main" id="{CD3352FE-C802-4B59-B9C6-8537C3B54DEF}"/>
+              </a:ext>
+            </a:extLst>
+          </p:cNvPr>
+          <p:cNvSpPr/>
+          <p:nvPr/>
+        </p:nvSpPr>
+        <p:spPr>
+          <a:xfrm>
+            <a:off x="5374556" y="3439191"/>
+            <a:ext cx="652286" cy="156357"/>
+          </a:xfrm>
+          <a:prstGeom prst="rect">
+            <a:avLst/>
+          </a:prstGeom>
+        </p:spPr>
+        <p:style>
+          <a:lnRef idx="3">
+            <a:schemeClr val="lt1"/>
+          </a:lnRef>
+          <a:fillRef idx="1">
+            <a:schemeClr val="accent1"/>
+          </a:fillRef>
+          <a:effectRef idx="1">
+            <a:schemeClr val="accent1"/>
+          </a:effectRef>
+          <a:fontRef idx="minor">
+            <a:schemeClr val="lt1"/>
+          </a:fontRef>
+        </p:style>
+        <p:txBody>
+          <a:bodyPr rtlCol="0" anchor="t"/>
+          <a:lstStyle/>
+          <a:p>
+            <a:pPr algn="ctr"/>
+            <a:r>
+              <a:rPr lang="en-US" sz="800" dirty="0"/>
+              <a:t>Data</a:t>
+            </a:r>
+          </a:p>
+        </p:txBody>
+      </p:sp>
+      <p:sp>
+        <p:nvSpPr>
+          <p:cNvPr id="39" name="Oval 38">
+            <a:extLst>
+              <a:ext uri="{FF2B5EF4-FFF2-40B4-BE49-F238E27FC236}">
+                <a16:creationId xmlns:a16="http://schemas.microsoft.com/office/drawing/2014/main" id="{9E85DDB3-9C33-4611-A328-0E8DEEC39D6D}"/>
+              </a:ext>
+            </a:extLst>
+          </p:cNvPr>
+          <p:cNvSpPr/>
+          <p:nvPr/>
+        </p:nvSpPr>
+        <p:spPr>
+          <a:xfrm>
+            <a:off x="5470604" y="3659159"/>
+            <a:ext cx="45719" cy="45719"/>
+          </a:xfrm>
+          <a:prstGeom prst="ellipse">
+            <a:avLst/>
+          </a:prstGeom>
+          <a:solidFill>
+            <a:schemeClr val="bg1"/>
+          </a:solidFill>
+          <a:ln>
+            <a:solidFill>
+              <a:schemeClr val="bg1"/>
+            </a:solidFill>
+          </a:ln>
+        </p:spPr>
+        <p:style>
+          <a:lnRef idx="2">
+            <a:schemeClr val="accent1">
+              <a:shade val="50000"/>
+            </a:schemeClr>
+          </a:lnRef>
+          <a:fillRef idx="1">
+            <a:schemeClr val="accent1"/>
+          </a:fillRef>
+          <a:effectRef idx="0">
+            <a:schemeClr val="accent1"/>
+          </a:effectRef>
+          <a:fontRef idx="minor">
+            <a:schemeClr val="lt1"/>
+          </a:fontRef>
+        </p:style>
+        <p:txBody>
+          <a:bodyPr rtlCol="0" anchor="t"/>
+          <a:lstStyle/>
+          <a:p>
+            <a:pPr algn="ctr"/>
+            <a:endParaRPr lang="en-US" sz="1400" dirty="0"/>
+          </a:p>
+        </p:txBody>
+      </p:sp>
+      <p:sp>
+        <p:nvSpPr>
+          <p:cNvPr id="92" name="Oval 91">
+            <a:extLst>
+              <a:ext uri="{FF2B5EF4-FFF2-40B4-BE49-F238E27FC236}">
+                <a16:creationId xmlns:a16="http://schemas.microsoft.com/office/drawing/2014/main" id="{0A9F81DC-1148-4EAE-9922-104B98D4AFF7}"/>
+              </a:ext>
+            </a:extLst>
+          </p:cNvPr>
+          <p:cNvSpPr/>
+          <p:nvPr/>
+        </p:nvSpPr>
+        <p:spPr>
+          <a:xfrm>
+            <a:off x="5470604" y="3766079"/>
+            <a:ext cx="45719" cy="45719"/>
+          </a:xfrm>
+          <a:prstGeom prst="ellipse">
+            <a:avLst/>
+          </a:prstGeom>
+          <a:solidFill>
+            <a:schemeClr val="bg1"/>
+          </a:solidFill>
+          <a:ln>
+            <a:solidFill>
+              <a:schemeClr val="bg1"/>
+            </a:solidFill>
+          </a:ln>
+        </p:spPr>
+        <p:style>
+          <a:lnRef idx="2">
+            <a:schemeClr val="accent1">
+              <a:shade val="50000"/>
+            </a:schemeClr>
+          </a:lnRef>
+          <a:fillRef idx="1">
+            <a:schemeClr val="accent1"/>
+          </a:fillRef>
+          <a:effectRef idx="0">
+            <a:schemeClr val="accent1"/>
+          </a:effectRef>
+          <a:fontRef idx="minor">
+            <a:schemeClr val="lt1"/>
+          </a:fontRef>
+        </p:style>
+        <p:txBody>
+          <a:bodyPr rtlCol="0" anchor="t"/>
+          <a:lstStyle/>
+          <a:p>
+            <a:pPr algn="ctr"/>
+            <a:endParaRPr lang="en-US" sz="1400" dirty="0"/>
+          </a:p>
+        </p:txBody>
+      </p:sp>
+      <p:sp>
+        <p:nvSpPr>
+          <p:cNvPr id="93" name="Oval 92">
+            <a:extLst>
+              <a:ext uri="{FF2B5EF4-FFF2-40B4-BE49-F238E27FC236}">
+                <a16:creationId xmlns:a16="http://schemas.microsoft.com/office/drawing/2014/main" id="{24CBA015-A010-4188-8123-DC85BE135288}"/>
+              </a:ext>
+            </a:extLst>
+          </p:cNvPr>
+          <p:cNvSpPr/>
+          <p:nvPr/>
+        </p:nvSpPr>
+        <p:spPr>
+          <a:xfrm>
+            <a:off x="5472796" y="3870197"/>
+            <a:ext cx="45719" cy="45719"/>
+          </a:xfrm>
+          <a:prstGeom prst="ellipse">
+            <a:avLst/>
+          </a:prstGeom>
+          <a:solidFill>
+            <a:schemeClr val="bg1"/>
+          </a:solidFill>
+          <a:ln>
+            <a:solidFill>
+              <a:schemeClr val="bg1"/>
+            </a:solidFill>
+          </a:ln>
+        </p:spPr>
+        <p:style>
+          <a:lnRef idx="2">
+            <a:schemeClr val="accent1">
+              <a:shade val="50000"/>
+            </a:schemeClr>
+          </a:lnRef>
+          <a:fillRef idx="1">
+            <a:schemeClr val="accent1"/>
+          </a:fillRef>
+          <a:effectRef idx="0">
+            <a:schemeClr val="accent1"/>
+          </a:effectRef>
+          <a:fontRef idx="minor">
+            <a:schemeClr val="lt1"/>
+          </a:fontRef>
+        </p:style>
+        <p:txBody>
+          <a:bodyPr rtlCol="0" anchor="t"/>
+          <a:lstStyle/>
+          <a:p>
+            <a:pPr algn="ctr"/>
+            <a:endParaRPr lang="en-US" sz="1400" dirty="0"/>
+          </a:p>
+        </p:txBody>
+      </p:sp>
+      <p:cxnSp>
+        <p:nvCxnSpPr>
+          <p:cNvPr id="97" name="Connector: Elbow 96">
+            <a:extLst>
+              <a:ext uri="{FF2B5EF4-FFF2-40B4-BE49-F238E27FC236}">
+                <a16:creationId xmlns:a16="http://schemas.microsoft.com/office/drawing/2014/main" id="{C67F9B1D-E964-4ABD-889C-C2FA72653397}"/>
+              </a:ext>
+            </a:extLst>
+          </p:cNvPr>
+          <p:cNvCxnSpPr>
+            <a:stCxn id="71" idx="3"/>
+          </p:cNvCxnSpPr>
+          <p:nvPr/>
+        </p:nvCxnSpPr>
+        <p:spPr>
+          <a:xfrm>
+            <a:off x="2032754" y="5329463"/>
+            <a:ext cx="199386" cy="1233653"/>
+          </a:xfrm>
+          <a:prstGeom prst="bentConnector2">
+            <a:avLst/>
+          </a:prstGeom>
+        </p:spPr>
+        <p:style>
+          <a:lnRef idx="3">
+            <a:schemeClr val="dk1"/>
+          </a:lnRef>
+          <a:fillRef idx="0">
+            <a:schemeClr val="dk1"/>
+          </a:fillRef>
+          <a:effectRef idx="2">
+            <a:schemeClr val="dk1"/>
+          </a:effectRef>
+          <a:fontRef idx="minor">
+            <a:schemeClr val="tx1"/>
+          </a:fontRef>
+        </p:style>
+      </p:cxnSp>
+      <p:cxnSp>
+        <p:nvCxnSpPr>
+          <p:cNvPr id="102" name="Connector: Elbow 101">
+            <a:extLst>
+              <a:ext uri="{FF2B5EF4-FFF2-40B4-BE49-F238E27FC236}">
+                <a16:creationId xmlns:a16="http://schemas.microsoft.com/office/drawing/2014/main" id="{22C82191-0DBB-4E4A-B7BD-2982DCDC085B}"/>
+              </a:ext>
+            </a:extLst>
+          </p:cNvPr>
+          <p:cNvCxnSpPr>
+            <a:endCxn id="66" idx="3"/>
+          </p:cNvCxnSpPr>
+          <p:nvPr/>
+        </p:nvCxnSpPr>
+        <p:spPr>
+          <a:xfrm rot="16200000" flipV="1">
+            <a:off x="1930340" y="5027663"/>
+            <a:ext cx="390753" cy="212848"/>
+          </a:xfrm>
+          <a:prstGeom prst="bentConnector2">
+            <a:avLst/>
+          </a:prstGeom>
+          <a:ln>
+            <a:tailEnd type="triangle"/>
+          </a:ln>
+        </p:spPr>
+        <p:style>
+          <a:lnRef idx="3">
+            <a:schemeClr val="dk1"/>
+          </a:lnRef>
+          <a:fillRef idx="0">
+            <a:schemeClr val="dk1"/>
+          </a:fillRef>
+          <a:effectRef idx="2">
+            <a:schemeClr val="dk1"/>
+          </a:effectRef>
+          <a:fontRef idx="minor">
+            <a:schemeClr val="tx1"/>
+          </a:fontRef>
+        </p:style>
+      </p:cxnSp>
+      <p:cxnSp>
+        <p:nvCxnSpPr>
+          <p:cNvPr id="104" name="Straight Arrow Connector 103">
+            <a:extLst>
+              <a:ext uri="{FF2B5EF4-FFF2-40B4-BE49-F238E27FC236}">
+                <a16:creationId xmlns:a16="http://schemas.microsoft.com/office/drawing/2014/main" id="{48588D77-4D7E-4E35-BBE2-791C870D7E8B}"/>
+              </a:ext>
+            </a:extLst>
+          </p:cNvPr>
+          <p:cNvCxnSpPr>
+            <a:stCxn id="71" idx="3"/>
+          </p:cNvCxnSpPr>
+          <p:nvPr/>
+        </p:nvCxnSpPr>
+        <p:spPr>
+          <a:xfrm>
+            <a:off x="2032754" y="5329463"/>
+            <a:ext cx="199386" cy="0"/>
+          </a:xfrm>
+          <a:prstGeom prst="straightConnector1">
+            <a:avLst/>
+          </a:prstGeom>
+          <a:ln>
+            <a:tailEnd type="triangle"/>
+          </a:ln>
+        </p:spPr>
+        <p:style>
+          <a:lnRef idx="3">
+            <a:schemeClr val="dk1"/>
+          </a:lnRef>
+          <a:fillRef idx="0">
+            <a:schemeClr val="dk1"/>
+          </a:fillRef>
+          <a:effectRef idx="2">
+            <a:schemeClr val="dk1"/>
+          </a:effectRef>
+          <a:fontRef idx="minor">
+            <a:schemeClr val="tx1"/>
+          </a:fontRef>
+        </p:style>
+      </p:cxnSp>
+      <p:cxnSp>
+        <p:nvCxnSpPr>
+          <p:cNvPr id="106" name="Straight Arrow Connector 105">
+            <a:extLst>
+              <a:ext uri="{FF2B5EF4-FFF2-40B4-BE49-F238E27FC236}">
+                <a16:creationId xmlns:a16="http://schemas.microsoft.com/office/drawing/2014/main" id="{5D72D504-10AB-470C-BF60-ACB07A195E22}"/>
+              </a:ext>
+            </a:extLst>
+          </p:cNvPr>
+          <p:cNvCxnSpPr>
+            <a:stCxn id="29" idx="3"/>
+          </p:cNvCxnSpPr>
+          <p:nvPr/>
+        </p:nvCxnSpPr>
+        <p:spPr>
+          <a:xfrm>
+            <a:off x="4479419" y="5287116"/>
+            <a:ext cx="244332" cy="0"/>
+          </a:xfrm>
+          <a:prstGeom prst="straightConnector1">
+            <a:avLst/>
+          </a:prstGeom>
+          <a:ln>
+            <a:tailEnd type="triangle"/>
+          </a:ln>
+        </p:spPr>
+        <p:style>
+          <a:lnRef idx="3">
+            <a:schemeClr val="dk1"/>
+          </a:lnRef>
+          <a:fillRef idx="0">
+            <a:schemeClr val="dk1"/>
+          </a:fillRef>
+          <a:effectRef idx="2">
+            <a:schemeClr val="dk1"/>
+          </a:effectRef>
+          <a:fontRef idx="minor">
+            <a:schemeClr val="tx1"/>
+          </a:fontRef>
+        </p:style>
+      </p:cxnSp>
+      <p:sp>
+        <p:nvSpPr>
+          <p:cNvPr id="110" name="Rectangle 109">
+            <a:extLst>
+              <a:ext uri="{FF2B5EF4-FFF2-40B4-BE49-F238E27FC236}">
+                <a16:creationId xmlns:a16="http://schemas.microsoft.com/office/drawing/2014/main" id="{AA1B3C93-A52C-4E08-BF0A-2567F9BA9E7E}"/>
+              </a:ext>
+            </a:extLst>
+          </p:cNvPr>
+          <p:cNvSpPr/>
+          <p:nvPr/>
+        </p:nvSpPr>
+        <p:spPr>
+          <a:xfrm>
+            <a:off x="5816600" y="4975137"/>
+            <a:ext cx="3935680" cy="991911"/>
+          </a:xfrm>
+          <a:prstGeom prst="rect">
+            <a:avLst/>
+          </a:prstGeom>
+        </p:spPr>
+        <p:style>
+          <a:lnRef idx="2">
+            <a:schemeClr val="accent4">
+              <a:shade val="50000"/>
+            </a:schemeClr>
+          </a:lnRef>
+          <a:fillRef idx="1">
+            <a:schemeClr val="accent4"/>
+          </a:fillRef>
+          <a:effectRef idx="0">
+            <a:schemeClr val="accent4"/>
+          </a:effectRef>
+          <a:fontRef idx="minor">
+            <a:schemeClr val="lt1"/>
+          </a:fontRef>
+        </p:style>
+        <p:txBody>
+          <a:bodyPr rtlCol="0" anchor="t"/>
+          <a:lstStyle/>
+          <a:p>
+            <a:pPr algn="ctr"/>
+            <a:r>
+              <a:rPr lang="en-US" sz="1400" dirty="0"/>
+              <a:t>CAN CONTROLLER (WIP)</a:t>
+            </a:r>
+          </a:p>
+        </p:txBody>
+      </p:sp>
+      <p:cxnSp>
+        <p:nvCxnSpPr>
+          <p:cNvPr id="115" name="Connector: Elbow 114">
+            <a:extLst>
+              <a:ext uri="{FF2B5EF4-FFF2-40B4-BE49-F238E27FC236}">
+                <a16:creationId xmlns:a16="http://schemas.microsoft.com/office/drawing/2014/main" id="{5FA024FC-47DA-48B5-AA88-6B21422F027A}"/>
+              </a:ext>
+            </a:extLst>
+          </p:cNvPr>
+          <p:cNvCxnSpPr>
+            <a:cxnSpLocks/>
+            <a:stCxn id="88" idx="2"/>
+            <a:endCxn id="110" idx="0"/>
+          </p:cNvCxnSpPr>
+          <p:nvPr/>
+        </p:nvCxnSpPr>
+        <p:spPr>
+          <a:xfrm rot="5400000">
+            <a:off x="9272986" y="3054708"/>
+            <a:ext cx="431884" cy="3408975"/>
+          </a:xfrm>
+          <a:prstGeom prst="bentConnector3">
+            <a:avLst>
+              <a:gd name="adj1" fmla="val 50000"/>
+            </a:avLst>
+          </a:prstGeom>
+          <a:ln>
+            <a:tailEnd type="triangle"/>
+          </a:ln>
+        </p:spPr>
+        <p:style>
+          <a:lnRef idx="3">
+            <a:schemeClr val="dk1"/>
+          </a:lnRef>
+          <a:fillRef idx="0">
+            <a:schemeClr val="dk1"/>
+          </a:fillRef>
+          <a:effectRef idx="2">
+            <a:schemeClr val="dk1"/>
+          </a:effectRef>
+          <a:fontRef idx="minor">
+            <a:schemeClr val="tx1"/>
+          </a:fontRef>
+        </p:style>
+      </p:cxnSp>
+      <p:cxnSp>
+        <p:nvCxnSpPr>
+          <p:cNvPr id="118" name="Connector: Elbow 117">
+            <a:extLst>
+              <a:ext uri="{FF2B5EF4-FFF2-40B4-BE49-F238E27FC236}">
+                <a16:creationId xmlns:a16="http://schemas.microsoft.com/office/drawing/2014/main" id="{092A3BC5-58F9-4416-ABB2-761B6E076B24}"/>
+              </a:ext>
+            </a:extLst>
+          </p:cNvPr>
+          <p:cNvCxnSpPr>
+            <a:cxnSpLocks/>
+            <a:stCxn id="128" idx="3"/>
+            <a:endCxn id="101" idx="1"/>
+          </p:cNvCxnSpPr>
+          <p:nvPr/>
+        </p:nvCxnSpPr>
+        <p:spPr>
+          <a:xfrm>
+            <a:off x="9462668" y="5595667"/>
+            <a:ext cx="1015200" cy="731365"/>
+          </a:xfrm>
+          <a:prstGeom prst="bentConnector3">
+            <a:avLst/>
+          </a:prstGeom>
+          <a:ln>
+            <a:tailEnd type="triangle"/>
+          </a:ln>
+        </p:spPr>
+        <p:style>
+          <a:lnRef idx="3">
+            <a:schemeClr val="dk1"/>
+          </a:lnRef>
+          <a:fillRef idx="0">
+            <a:schemeClr val="dk1"/>
+          </a:fillRef>
+          <a:effectRef idx="2">
+            <a:schemeClr val="dk1"/>
+          </a:effectRef>
+          <a:fontRef idx="minor">
+            <a:schemeClr val="tx1"/>
+          </a:fontRef>
+        </p:style>
+      </p:cxnSp>
+      <p:sp>
+        <p:nvSpPr>
+          <p:cNvPr id="121" name="TextBox 120">
+            <a:extLst>
+              <a:ext uri="{FF2B5EF4-FFF2-40B4-BE49-F238E27FC236}">
+                <a16:creationId xmlns:a16="http://schemas.microsoft.com/office/drawing/2014/main" id="{CCDAE240-223A-4D0B-AFE1-718F3EAEE51B}"/>
               </a:ext>
             </a:extLst>
           </p:cNvPr>
@@ -5211,8 +6839,8 @@
         </p:nvSpPr>
         <p:spPr>
           <a:xfrm>
-            <a:off x="10477868" y="5865367"/>
-            <a:ext cx="1497581" cy="923330"/>
+            <a:off x="6432978" y="6105723"/>
+            <a:ext cx="2689149" cy="646331"/>
           </a:xfrm>
           <a:prstGeom prst="rect">
             <a:avLst/>
@@ -5228,11 +6856,202 @@
             <a:pPr algn="ctr"/>
             <a:r>
               <a:rPr lang="en-US" dirty="0"/>
-              <a:t>Sensor Data Output on CAN BUS</a:t>
-            </a:r>
-          </a:p>
-        </p:txBody>
-      </p:sp>
+              <a:t>CAN Receive Message </a:t>
+            </a:r>
+          </a:p>
+          <a:p>
+            <a:pPr algn="ctr"/>
+            <a:r>
+              <a:rPr lang="en-US" dirty="0"/>
+              <a:t> (i.e. Time Sync, etc.)</a:t>
+            </a:r>
+          </a:p>
+        </p:txBody>
+      </p:sp>
+      <p:sp>
+        <p:nvSpPr>
+          <p:cNvPr id="126" name="Rectangle 125">
+            <a:extLst>
+              <a:ext uri="{FF2B5EF4-FFF2-40B4-BE49-F238E27FC236}">
+                <a16:creationId xmlns:a16="http://schemas.microsoft.com/office/drawing/2014/main" id="{E1D86C55-FEA5-4FF4-8691-8D92F80522D0}"/>
+              </a:ext>
+            </a:extLst>
+          </p:cNvPr>
+          <p:cNvSpPr/>
+          <p:nvPr/>
+        </p:nvSpPr>
+        <p:spPr>
+          <a:xfrm>
+            <a:off x="6116231" y="5371624"/>
+            <a:ext cx="1609272" cy="448085"/>
+          </a:xfrm>
+          <a:prstGeom prst="rect">
+            <a:avLst/>
+          </a:prstGeom>
+        </p:spPr>
+        <p:style>
+          <a:lnRef idx="2">
+            <a:schemeClr val="accent1">
+              <a:shade val="50000"/>
+            </a:schemeClr>
+          </a:lnRef>
+          <a:fillRef idx="1">
+            <a:schemeClr val="accent1"/>
+          </a:fillRef>
+          <a:effectRef idx="0">
+            <a:schemeClr val="accent1"/>
+          </a:effectRef>
+          <a:fontRef idx="minor">
+            <a:schemeClr val="lt1"/>
+          </a:fontRef>
+        </p:style>
+        <p:txBody>
+          <a:bodyPr rtlCol="0" anchor="t"/>
+          <a:lstStyle/>
+          <a:p>
+            <a:pPr algn="ctr"/>
+            <a:r>
+              <a:rPr lang="en-US" sz="1400" dirty="0"/>
+              <a:t>Input Control</a:t>
+            </a:r>
+          </a:p>
+        </p:txBody>
+      </p:sp>
+      <p:sp>
+        <p:nvSpPr>
+          <p:cNvPr id="128" name="Rectangle 127">
+            <a:extLst>
+              <a:ext uri="{FF2B5EF4-FFF2-40B4-BE49-F238E27FC236}">
+                <a16:creationId xmlns:a16="http://schemas.microsoft.com/office/drawing/2014/main" id="{3DA14D0A-64AB-4B96-8937-F94CA6031968}"/>
+              </a:ext>
+            </a:extLst>
+          </p:cNvPr>
+          <p:cNvSpPr/>
+          <p:nvPr/>
+        </p:nvSpPr>
+        <p:spPr>
+          <a:xfrm>
+            <a:off x="7853396" y="5371624"/>
+            <a:ext cx="1609272" cy="448085"/>
+          </a:xfrm>
+          <a:prstGeom prst="rect">
+            <a:avLst/>
+          </a:prstGeom>
+        </p:spPr>
+        <p:style>
+          <a:lnRef idx="2">
+            <a:schemeClr val="accent1">
+              <a:shade val="50000"/>
+            </a:schemeClr>
+          </a:lnRef>
+          <a:fillRef idx="1">
+            <a:schemeClr val="accent1"/>
+          </a:fillRef>
+          <a:effectRef idx="0">
+            <a:schemeClr val="accent1"/>
+          </a:effectRef>
+          <a:fontRef idx="minor">
+            <a:schemeClr val="lt1"/>
+          </a:fontRef>
+        </p:style>
+        <p:txBody>
+          <a:bodyPr rtlCol="0" anchor="t"/>
+          <a:lstStyle/>
+          <a:p>
+            <a:pPr algn="ctr"/>
+            <a:r>
+              <a:rPr lang="en-US" sz="1400" dirty="0"/>
+              <a:t>Output Control</a:t>
+            </a:r>
+          </a:p>
+        </p:txBody>
+      </p:sp>
+      <p:cxnSp>
+        <p:nvCxnSpPr>
+          <p:cNvPr id="131" name="Connector: Elbow 130">
+            <a:extLst>
+              <a:ext uri="{FF2B5EF4-FFF2-40B4-BE49-F238E27FC236}">
+                <a16:creationId xmlns:a16="http://schemas.microsoft.com/office/drawing/2014/main" id="{33B2ED5B-0FC6-436A-AD35-160B880AB0E1}"/>
+              </a:ext>
+            </a:extLst>
+          </p:cNvPr>
+          <p:cNvCxnSpPr>
+            <a:stCxn id="121" idx="0"/>
+            <a:endCxn id="126" idx="2"/>
+          </p:cNvCxnSpPr>
+          <p:nvPr/>
+        </p:nvCxnSpPr>
+        <p:spPr>
+          <a:xfrm rot="16200000" flipV="1">
+            <a:off x="7206203" y="5534373"/>
+            <a:ext cx="286014" cy="856686"/>
+          </a:xfrm>
+          <a:prstGeom prst="bentConnector3">
+            <a:avLst>
+              <a:gd name="adj1" fmla="val 23358"/>
+            </a:avLst>
+          </a:prstGeom>
+          <a:ln>
+            <a:tailEnd type="triangle"/>
+          </a:ln>
+        </p:spPr>
+        <p:style>
+          <a:lnRef idx="3">
+            <a:schemeClr val="dk1"/>
+          </a:lnRef>
+          <a:fillRef idx="0">
+            <a:schemeClr val="dk1"/>
+          </a:fillRef>
+          <a:effectRef idx="2">
+            <a:schemeClr val="dk1"/>
+          </a:effectRef>
+          <a:fontRef idx="minor">
+            <a:schemeClr val="tx1"/>
+          </a:fontRef>
+        </p:style>
+      </p:cxnSp>
+      <p:cxnSp>
+        <p:nvCxnSpPr>
+          <p:cNvPr id="134" name="Connector: Elbow 133">
+            <a:extLst>
+              <a:ext uri="{FF2B5EF4-FFF2-40B4-BE49-F238E27FC236}">
+                <a16:creationId xmlns:a16="http://schemas.microsoft.com/office/drawing/2014/main" id="{6817176C-1F80-4678-A802-4F8EC4624834}"/>
+              </a:ext>
+            </a:extLst>
+          </p:cNvPr>
+          <p:cNvCxnSpPr>
+            <a:stCxn id="126" idx="1"/>
+            <a:endCxn id="2" idx="2"/>
+          </p:cNvCxnSpPr>
+          <p:nvPr/>
+        </p:nvCxnSpPr>
+        <p:spPr>
+          <a:xfrm rot="10800000">
+            <a:off x="5489981" y="4508331"/>
+            <a:ext cx="626251" cy="1087336"/>
+          </a:xfrm>
+          <a:prstGeom prst="bentConnector2">
+            <a:avLst/>
+          </a:prstGeom>
+          <a:ln>
+            <a:tailEnd type="triangle"/>
+          </a:ln>
+        </p:spPr>
+        <p:style>
+          <a:lnRef idx="3">
+            <a:schemeClr val="dk1"/>
+          </a:lnRef>
+          <a:fillRef idx="0">
+            <a:schemeClr val="dk1"/>
+          </a:fillRef>
+          <a:effectRef idx="2">
+            <a:schemeClr val="dk1"/>
+          </a:effectRef>
+          <a:fontRef idx="minor">
+            <a:schemeClr val="tx1"/>
+          </a:fontRef>
+        </p:style>
+      </p:cxnSp>
     </p:spTree>
     <p:extLst>
       <p:ext uri="{BB962C8B-B14F-4D97-AF65-F5344CB8AC3E}">

</xml_diff>